<commit_message>
add: design of music setting screen
</commit_message>
<xml_diff>
--- a/design.pptx
+++ b/design.pptx
@@ -18,11 +18,12 @@
     <p:sldId id="267" r:id="rId12"/>
     <p:sldId id="268" r:id="rId13"/>
     <p:sldId id="266" r:id="rId14"/>
-    <p:sldId id="274" r:id="rId15"/>
-    <p:sldId id="270" r:id="rId16"/>
-    <p:sldId id="272" r:id="rId17"/>
-    <p:sldId id="271" r:id="rId18"/>
-    <p:sldId id="273" r:id="rId19"/>
+    <p:sldId id="275" r:id="rId15"/>
+    <p:sldId id="274" r:id="rId16"/>
+    <p:sldId id="270" r:id="rId17"/>
+    <p:sldId id="272" r:id="rId18"/>
+    <p:sldId id="271" r:id="rId19"/>
+    <p:sldId id="273" r:id="rId20"/>
   </p:sldIdLst>
   <p:sldSz cx="12192000" cy="6858000"/>
   <p:notesSz cx="6858000" cy="9144000"/>
@@ -276,7 +277,7 @@
           <a:p>
             <a:fld id="{92A24FDA-9713-4B2A-B123-08E9636CCA2B}" type="datetimeFigureOut">
               <a:rPr kumimoji="1" lang="ja-JP" altLang="en-US" smtClean="0"/>
-              <a:t>2023/9/9</a:t>
+              <a:t>2023/9/13</a:t>
             </a:fld>
             <a:endParaRPr kumimoji="1" lang="ja-JP" altLang="en-US"/>
           </a:p>
@@ -506,7 +507,7 @@
           <a:p>
             <a:fld id="{92A24FDA-9713-4B2A-B123-08E9636CCA2B}" type="datetimeFigureOut">
               <a:rPr kumimoji="1" lang="ja-JP" altLang="en-US" smtClean="0"/>
-              <a:t>2023/9/9</a:t>
+              <a:t>2023/9/13</a:t>
             </a:fld>
             <a:endParaRPr kumimoji="1" lang="ja-JP" altLang="en-US"/>
           </a:p>
@@ -746,7 +747,7 @@
           <a:p>
             <a:fld id="{92A24FDA-9713-4B2A-B123-08E9636CCA2B}" type="datetimeFigureOut">
               <a:rPr kumimoji="1" lang="ja-JP" altLang="en-US" smtClean="0"/>
-              <a:t>2023/9/9</a:t>
+              <a:t>2023/9/13</a:t>
             </a:fld>
             <a:endParaRPr kumimoji="1" lang="ja-JP" altLang="en-US"/>
           </a:p>
@@ -976,7 +977,7 @@
           <a:p>
             <a:fld id="{92A24FDA-9713-4B2A-B123-08E9636CCA2B}" type="datetimeFigureOut">
               <a:rPr kumimoji="1" lang="ja-JP" altLang="en-US" smtClean="0"/>
-              <a:t>2023/9/9</a:t>
+              <a:t>2023/9/13</a:t>
             </a:fld>
             <a:endParaRPr kumimoji="1" lang="ja-JP" altLang="en-US"/>
           </a:p>
@@ -1251,7 +1252,7 @@
           <a:p>
             <a:fld id="{92A24FDA-9713-4B2A-B123-08E9636CCA2B}" type="datetimeFigureOut">
               <a:rPr kumimoji="1" lang="ja-JP" altLang="en-US" smtClean="0"/>
-              <a:t>2023/9/9</a:t>
+              <a:t>2023/9/13</a:t>
             </a:fld>
             <a:endParaRPr kumimoji="1" lang="ja-JP" altLang="en-US"/>
           </a:p>
@@ -1580,7 +1581,7 @@
           <a:p>
             <a:fld id="{92A24FDA-9713-4B2A-B123-08E9636CCA2B}" type="datetimeFigureOut">
               <a:rPr kumimoji="1" lang="ja-JP" altLang="en-US" smtClean="0"/>
-              <a:t>2023/9/9</a:t>
+              <a:t>2023/9/13</a:t>
             </a:fld>
             <a:endParaRPr kumimoji="1" lang="ja-JP" altLang="en-US"/>
           </a:p>
@@ -2056,7 +2057,7 @@
           <a:p>
             <a:fld id="{92A24FDA-9713-4B2A-B123-08E9636CCA2B}" type="datetimeFigureOut">
               <a:rPr kumimoji="1" lang="ja-JP" altLang="en-US" smtClean="0"/>
-              <a:t>2023/9/9</a:t>
+              <a:t>2023/9/13</a:t>
             </a:fld>
             <a:endParaRPr kumimoji="1" lang="ja-JP" altLang="en-US"/>
           </a:p>
@@ -2197,7 +2198,7 @@
           <a:p>
             <a:fld id="{92A24FDA-9713-4B2A-B123-08E9636CCA2B}" type="datetimeFigureOut">
               <a:rPr kumimoji="1" lang="ja-JP" altLang="en-US" smtClean="0"/>
-              <a:t>2023/9/9</a:t>
+              <a:t>2023/9/13</a:t>
             </a:fld>
             <a:endParaRPr kumimoji="1" lang="ja-JP" altLang="en-US"/>
           </a:p>
@@ -2310,7 +2311,7 @@
           <a:p>
             <a:fld id="{92A24FDA-9713-4B2A-B123-08E9636CCA2B}" type="datetimeFigureOut">
               <a:rPr kumimoji="1" lang="ja-JP" altLang="en-US" smtClean="0"/>
-              <a:t>2023/9/9</a:t>
+              <a:t>2023/9/13</a:t>
             </a:fld>
             <a:endParaRPr kumimoji="1" lang="ja-JP" altLang="en-US"/>
           </a:p>
@@ -2653,7 +2654,7 @@
           <a:p>
             <a:fld id="{92A24FDA-9713-4B2A-B123-08E9636CCA2B}" type="datetimeFigureOut">
               <a:rPr kumimoji="1" lang="ja-JP" altLang="en-US" smtClean="0"/>
-              <a:t>2023/9/9</a:t>
+              <a:t>2023/9/13</a:t>
             </a:fld>
             <a:endParaRPr kumimoji="1" lang="ja-JP" altLang="en-US"/>
           </a:p>
@@ -2941,7 +2942,7 @@
           <a:p>
             <a:fld id="{92A24FDA-9713-4B2A-B123-08E9636CCA2B}" type="datetimeFigureOut">
               <a:rPr kumimoji="1" lang="ja-JP" altLang="en-US" smtClean="0"/>
-              <a:t>2023/9/9</a:t>
+              <a:t>2023/9/13</a:t>
             </a:fld>
             <a:endParaRPr kumimoji="1" lang="ja-JP" altLang="en-US"/>
           </a:p>
@@ -3214,7 +3215,7 @@
           <a:p>
             <a:fld id="{92A24FDA-9713-4B2A-B123-08E9636CCA2B}" type="datetimeFigureOut">
               <a:rPr kumimoji="1" lang="ja-JP" altLang="en-US" smtClean="0"/>
-              <a:t>2023/9/9</a:t>
+              <a:t>2023/9/13</a:t>
             </a:fld>
             <a:endParaRPr kumimoji="1" lang="ja-JP" altLang="en-US"/>
           </a:p>
@@ -3765,7 +3766,7 @@
         <p:spPr>
           <a:xfrm>
             <a:off x="1055931" y="5369676"/>
-            <a:ext cx="5519040" cy="646331"/>
+            <a:ext cx="5519040" cy="923330"/>
           </a:xfrm>
           <a:prstGeom prst="rect">
             <a:avLst/>
@@ -3805,6 +3806,22 @@
               <a:rPr kumimoji="1" lang="ja-JP" altLang="en-US" dirty="0"/>
               <a:t>問題ログ一覧画面</a:t>
             </a:r>
+            <a:endParaRPr lang="en-US" altLang="ja-JP" dirty="0"/>
+          </a:p>
+          <a:p>
+            <a:r>
+              <a:rPr kumimoji="1" lang="ja-JP" altLang="en-US" dirty="0"/>
+              <a:t>音性設定 </a:t>
+            </a:r>
+            <a:r>
+              <a:rPr kumimoji="1" lang="en-US" altLang="ja-JP" dirty="0"/>
+              <a:t>-&gt; </a:t>
+            </a:r>
+            <a:r>
+              <a:rPr kumimoji="1" lang="ja-JP" altLang="en-US" dirty="0"/>
+              <a:t>音声設定画面</a:t>
+            </a:r>
+            <a:endParaRPr kumimoji="1" lang="en-US" altLang="ja-JP" dirty="0"/>
           </a:p>
         </p:txBody>
       </p:sp>
@@ -3935,6 +3952,54 @@
             <a:r>
               <a:rPr lang="ja-JP" altLang="en-US" sz="3600" dirty="0"/>
               <a:t>履歴</a:t>
+            </a:r>
+          </a:p>
+        </p:txBody>
+      </p:sp>
+      <p:sp>
+        <p:nvSpPr>
+          <p:cNvPr id="5" name="テキスト ボックス 4">
+            <a:extLst>
+              <a:ext uri="{FF2B5EF4-FFF2-40B4-BE49-F238E27FC236}">
+                <a16:creationId xmlns:a16="http://schemas.microsoft.com/office/drawing/2014/main" id="{16AE651C-A001-C8C7-A5DA-E774E63B6088}"/>
+              </a:ext>
+            </a:extLst>
+          </p:cNvPr>
+          <p:cNvSpPr txBox="1"/>
+          <p:nvPr/>
+        </p:nvSpPr>
+        <p:spPr>
+          <a:xfrm>
+            <a:off x="1290579" y="3429000"/>
+            <a:ext cx="1386633" cy="1200329"/>
+          </a:xfrm>
+          <a:prstGeom prst="rect">
+            <a:avLst/>
+          </a:prstGeom>
+        </p:spPr>
+        <p:style>
+          <a:lnRef idx="2">
+            <a:schemeClr val="dk1"/>
+          </a:lnRef>
+          <a:fillRef idx="1">
+            <a:schemeClr val="lt1"/>
+          </a:fillRef>
+          <a:effectRef idx="0">
+            <a:schemeClr val="dk1"/>
+          </a:effectRef>
+          <a:fontRef idx="minor">
+            <a:schemeClr val="dk1"/>
+          </a:fontRef>
+        </p:style>
+        <p:txBody>
+          <a:bodyPr wrap="square">
+            <a:spAutoFit/>
+          </a:bodyPr>
+          <a:lstStyle/>
+          <a:p>
+            <a:r>
+              <a:rPr lang="ja-JP" altLang="en-US" sz="3600" dirty="0"/>
+              <a:t>音声設定</a:t>
             </a:r>
           </a:p>
         </p:txBody>
@@ -6182,10 +6247,49 @@
       </p:grpSpPr>
       <p:sp>
         <p:nvSpPr>
-          <p:cNvPr id="2" name="楕円 1">
-            <a:extLst>
-              <a:ext uri="{FF2B5EF4-FFF2-40B4-BE49-F238E27FC236}">
-                <a16:creationId xmlns:a16="http://schemas.microsoft.com/office/drawing/2014/main" id="{39AF3BCB-5E0D-8E5B-DE79-35909C8C0308}"/>
+          <p:cNvPr id="2" name="テキスト ボックス 1">
+            <a:extLst>
+              <a:ext uri="{FF2B5EF4-FFF2-40B4-BE49-F238E27FC236}">
+                <a16:creationId xmlns:a16="http://schemas.microsoft.com/office/drawing/2014/main" id="{52D73C05-0569-C3C1-290B-35C2EADEDFAA}"/>
+              </a:ext>
+            </a:extLst>
+          </p:cNvPr>
+          <p:cNvSpPr txBox="1"/>
+          <p:nvPr/>
+        </p:nvSpPr>
+        <p:spPr>
+          <a:xfrm>
+            <a:off x="985173" y="426448"/>
+            <a:ext cx="7043056" cy="707886"/>
+          </a:xfrm>
+          <a:prstGeom prst="rect">
+            <a:avLst/>
+          </a:prstGeom>
+          <a:noFill/>
+        </p:spPr>
+        <p:txBody>
+          <a:bodyPr wrap="square" rtlCol="0">
+            <a:spAutoFit/>
+          </a:bodyPr>
+          <a:lstStyle/>
+          <a:p>
+            <a:r>
+              <a:rPr lang="ja-JP" altLang="en-US" sz="4000" b="1" dirty="0"/>
+              <a:t>音声設定</a:t>
+            </a:r>
+            <a:r>
+              <a:rPr kumimoji="1" lang="ja-JP" altLang="en-US" sz="4000" b="1" dirty="0"/>
+              <a:t>画面</a:t>
+            </a:r>
+          </a:p>
+        </p:txBody>
+      </p:sp>
+      <p:sp>
+        <p:nvSpPr>
+          <p:cNvPr id="3" name="正方形/長方形 2">
+            <a:extLst>
+              <a:ext uri="{FF2B5EF4-FFF2-40B4-BE49-F238E27FC236}">
+                <a16:creationId xmlns:a16="http://schemas.microsoft.com/office/drawing/2014/main" id="{4DDFE798-54E2-C7DD-1E81-0EE9DE9E86B0}"/>
               </a:ext>
             </a:extLst>
           </p:cNvPr>
@@ -6194,13 +6298,13 @@
         </p:nvSpPr>
         <p:spPr>
           <a:xfrm>
-            <a:off x="4920791" y="593887"/>
-            <a:ext cx="1640264" cy="1027521"/>
-          </a:xfrm>
-          <a:prstGeom prst="ellipse">
+            <a:off x="1055930" y="1488324"/>
+            <a:ext cx="10818017" cy="4315710"/>
+          </a:xfrm>
+          <a:prstGeom prst="rect">
             <a:avLst/>
           </a:prstGeom>
-          <a:ln w="28575">
+          <a:ln w="57150">
             <a:solidFill>
               <a:schemeClr val="tx1"/>
             </a:solidFill>
@@ -6225,31 +6329,28 @@
           <a:lstStyle/>
           <a:p>
             <a:pPr algn="ctr"/>
-            <a:r>
-              <a:rPr kumimoji="1" lang="ja-JP" altLang="en-US" dirty="0"/>
-              <a:t>タイトル画面</a:t>
-            </a:r>
-          </a:p>
-        </p:txBody>
-      </p:sp>
-      <p:sp>
-        <p:nvSpPr>
-          <p:cNvPr id="3" name="楕円 2">
-            <a:extLst>
-              <a:ext uri="{FF2B5EF4-FFF2-40B4-BE49-F238E27FC236}">
-                <a16:creationId xmlns:a16="http://schemas.microsoft.com/office/drawing/2014/main" id="{8EF062F2-90EE-6847-E171-CEF93D24BF97}"/>
-              </a:ext>
-            </a:extLst>
-          </p:cNvPr>
-          <p:cNvSpPr/>
+            <a:endParaRPr kumimoji="1" lang="ja-JP" altLang="en-US"/>
+          </a:p>
+        </p:txBody>
+      </p:sp>
+      <p:sp>
+        <p:nvSpPr>
+          <p:cNvPr id="4" name="テキスト ボックス 3">
+            <a:extLst>
+              <a:ext uri="{FF2B5EF4-FFF2-40B4-BE49-F238E27FC236}">
+                <a16:creationId xmlns:a16="http://schemas.microsoft.com/office/drawing/2014/main" id="{EB5B19E4-060F-A4F8-103E-2715C599B475}"/>
+              </a:ext>
+            </a:extLst>
+          </p:cNvPr>
+          <p:cNvSpPr txBox="1"/>
           <p:nvPr/>
         </p:nvSpPr>
         <p:spPr>
           <a:xfrm>
-            <a:off x="8077881" y="453402"/>
-            <a:ext cx="1640264" cy="1027521"/>
-          </a:xfrm>
-          <a:prstGeom prst="ellipse">
+            <a:off x="10416613" y="4667569"/>
+            <a:ext cx="1153836" cy="923330"/>
+          </a:xfrm>
+          <a:prstGeom prst="rect">
             <a:avLst/>
           </a:prstGeom>
           <a:ln w="28575">
@@ -6260,882 +6361,36 @@
         </p:spPr>
         <p:style>
           <a:lnRef idx="2">
-            <a:schemeClr val="accent6"/>
+            <a:schemeClr val="dk1"/>
           </a:lnRef>
           <a:fillRef idx="1">
             <a:schemeClr val="lt1"/>
           </a:fillRef>
           <a:effectRef idx="0">
-            <a:schemeClr val="accent6"/>
+            <a:schemeClr val="dk1"/>
           </a:effectRef>
           <a:fontRef idx="minor">
             <a:schemeClr val="dk1"/>
           </a:fontRef>
         </p:style>
         <p:txBody>
-          <a:bodyPr rtlCol="0" anchor="ctr"/>
-          <a:lstStyle/>
-          <a:p>
-            <a:pPr algn="ctr"/>
+          <a:bodyPr wrap="square" rtlCol="0">
+            <a:spAutoFit/>
+          </a:bodyPr>
+          <a:lstStyle/>
+          <a:p>
             <a:r>
               <a:rPr lang="ja-JP" altLang="en-US" dirty="0"/>
-              <a:t>ログ</a:t>
-            </a:r>
-            <a:r>
-              <a:rPr kumimoji="1" lang="ja-JP" altLang="en-US" dirty="0"/>
-              <a:t>画面</a:t>
-            </a:r>
-          </a:p>
-        </p:txBody>
-      </p:sp>
-      <p:sp>
-        <p:nvSpPr>
-          <p:cNvPr id="4" name="楕円 3">
-            <a:extLst>
-              <a:ext uri="{FF2B5EF4-FFF2-40B4-BE49-F238E27FC236}">
-                <a16:creationId xmlns:a16="http://schemas.microsoft.com/office/drawing/2014/main" id="{12A27FF8-FA3A-1306-2566-AA803F9AE303}"/>
-              </a:ext>
-            </a:extLst>
-          </p:cNvPr>
-          <p:cNvSpPr/>
-          <p:nvPr/>
-        </p:nvSpPr>
-        <p:spPr>
-          <a:xfrm>
-            <a:off x="1638693" y="593887"/>
-            <a:ext cx="1934066" cy="1027521"/>
-          </a:xfrm>
-          <a:prstGeom prst="ellipse">
-            <a:avLst/>
-          </a:prstGeom>
-          <a:ln w="28575">
-            <a:solidFill>
-              <a:schemeClr val="tx1"/>
-            </a:solidFill>
-          </a:ln>
-        </p:spPr>
-        <p:style>
-          <a:lnRef idx="2">
-            <a:schemeClr val="accent6"/>
-          </a:lnRef>
-          <a:fillRef idx="1">
-            <a:schemeClr val="lt1"/>
-          </a:fillRef>
-          <a:effectRef idx="0">
-            <a:schemeClr val="accent6"/>
-          </a:effectRef>
-          <a:fontRef idx="minor">
-            <a:schemeClr val="dk1"/>
-          </a:fontRef>
-        </p:style>
-        <p:txBody>
-          <a:bodyPr rtlCol="0" anchor="ctr"/>
-          <a:lstStyle/>
-          <a:p>
-            <a:pPr algn="ctr"/>
-            <a:r>
-              <a:rPr lang="en-US" altLang="ja-JP" dirty="0"/>
-              <a:t>(Windows </a:t>
-            </a:r>
-            <a:r>
-              <a:rPr lang="ja-JP" altLang="en-US" dirty="0"/>
-              <a:t>のみ</a:t>
-            </a:r>
-            <a:r>
-              <a:rPr lang="en-US" altLang="ja-JP" dirty="0"/>
-              <a:t>)</a:t>
-            </a:r>
-            <a:r>
-              <a:rPr lang="ja-JP" altLang="en-US" dirty="0"/>
-              <a:t>音声設定</a:t>
-            </a:r>
-            <a:r>
-              <a:rPr kumimoji="1" lang="ja-JP" altLang="en-US" dirty="0"/>
-              <a:t>画面</a:t>
-            </a:r>
-          </a:p>
-        </p:txBody>
-      </p:sp>
-      <p:sp>
-        <p:nvSpPr>
-          <p:cNvPr id="5" name="楕円 4">
-            <a:extLst>
-              <a:ext uri="{FF2B5EF4-FFF2-40B4-BE49-F238E27FC236}">
-                <a16:creationId xmlns:a16="http://schemas.microsoft.com/office/drawing/2014/main" id="{B7241839-DFA3-6712-54BC-3EF846853E09}"/>
-              </a:ext>
-            </a:extLst>
-          </p:cNvPr>
-          <p:cNvSpPr/>
-          <p:nvPr/>
-        </p:nvSpPr>
-        <p:spPr>
-          <a:xfrm>
-            <a:off x="1011810" y="3905748"/>
-            <a:ext cx="1640264" cy="1027521"/>
-          </a:xfrm>
-          <a:prstGeom prst="ellipse">
-            <a:avLst/>
-          </a:prstGeom>
-          <a:ln w="28575">
-            <a:solidFill>
-              <a:schemeClr val="tx1"/>
-            </a:solidFill>
-          </a:ln>
-        </p:spPr>
-        <p:style>
-          <a:lnRef idx="2">
-            <a:schemeClr val="accent6"/>
-          </a:lnRef>
-          <a:fillRef idx="1">
-            <a:schemeClr val="lt1"/>
-          </a:fillRef>
-          <a:effectRef idx="0">
-            <a:schemeClr val="accent6"/>
-          </a:effectRef>
-          <a:fontRef idx="minor">
-            <a:schemeClr val="dk1"/>
-          </a:fontRef>
-        </p:style>
-        <p:txBody>
-          <a:bodyPr rtlCol="0" anchor="ctr"/>
-          <a:lstStyle/>
-          <a:p>
-            <a:pPr algn="ctr"/>
-            <a:r>
-              <a:rPr lang="ja-JP" altLang="en-US" dirty="0"/>
-              <a:t>問題選択</a:t>
-            </a:r>
-            <a:r>
-              <a:rPr kumimoji="1" lang="ja-JP" altLang="en-US" dirty="0"/>
-              <a:t>画面</a:t>
-            </a:r>
-          </a:p>
-        </p:txBody>
-      </p:sp>
-      <p:sp>
-        <p:nvSpPr>
-          <p:cNvPr id="6" name="楕円 5">
-            <a:extLst>
-              <a:ext uri="{FF2B5EF4-FFF2-40B4-BE49-F238E27FC236}">
-                <a16:creationId xmlns:a16="http://schemas.microsoft.com/office/drawing/2014/main" id="{ECF0B877-C8BC-EB03-59A1-6EBB91370F37}"/>
-              </a:ext>
-            </a:extLst>
-          </p:cNvPr>
-          <p:cNvSpPr/>
-          <p:nvPr/>
-        </p:nvSpPr>
-        <p:spPr>
-          <a:xfrm>
-            <a:off x="8898013" y="3923901"/>
-            <a:ext cx="1640264" cy="1027521"/>
-          </a:xfrm>
-          <a:prstGeom prst="ellipse">
-            <a:avLst/>
-          </a:prstGeom>
-          <a:ln w="28575">
-            <a:solidFill>
-              <a:schemeClr val="tx1"/>
-            </a:solidFill>
-          </a:ln>
-        </p:spPr>
-        <p:style>
-          <a:lnRef idx="2">
-            <a:schemeClr val="accent6"/>
-          </a:lnRef>
-          <a:fillRef idx="1">
-            <a:schemeClr val="lt1"/>
-          </a:fillRef>
-          <a:effectRef idx="0">
-            <a:schemeClr val="accent6"/>
-          </a:effectRef>
-          <a:fontRef idx="minor">
-            <a:schemeClr val="dk1"/>
-          </a:fontRef>
-        </p:style>
-        <p:txBody>
-          <a:bodyPr rtlCol="0" anchor="ctr"/>
-          <a:lstStyle/>
-          <a:p>
-            <a:pPr algn="ctr"/>
-            <a:r>
-              <a:rPr kumimoji="1" lang="ja-JP" altLang="en-US" dirty="0"/>
-              <a:t>結果画面</a:t>
-            </a:r>
-          </a:p>
-        </p:txBody>
-      </p:sp>
-      <p:sp>
-        <p:nvSpPr>
-          <p:cNvPr id="7" name="楕円 6">
-            <a:extLst>
-              <a:ext uri="{FF2B5EF4-FFF2-40B4-BE49-F238E27FC236}">
-                <a16:creationId xmlns:a16="http://schemas.microsoft.com/office/drawing/2014/main" id="{BBA5039E-DFFC-2C22-303B-23F4E2CAF39B}"/>
-              </a:ext>
-            </a:extLst>
-          </p:cNvPr>
-          <p:cNvSpPr/>
-          <p:nvPr/>
-        </p:nvSpPr>
-        <p:spPr>
-          <a:xfrm>
-            <a:off x="6372519" y="3923901"/>
-            <a:ext cx="1640264" cy="1027521"/>
-          </a:xfrm>
-          <a:prstGeom prst="ellipse">
-            <a:avLst/>
-          </a:prstGeom>
-          <a:ln w="28575">
-            <a:solidFill>
-              <a:schemeClr val="tx1"/>
-            </a:solidFill>
-          </a:ln>
-        </p:spPr>
-        <p:style>
-          <a:lnRef idx="2">
-            <a:schemeClr val="accent6"/>
-          </a:lnRef>
-          <a:fillRef idx="1">
-            <a:schemeClr val="lt1"/>
-          </a:fillRef>
-          <a:effectRef idx="0">
-            <a:schemeClr val="accent6"/>
-          </a:effectRef>
-          <a:fontRef idx="minor">
-            <a:schemeClr val="dk1"/>
-          </a:fontRef>
-        </p:style>
-        <p:txBody>
-          <a:bodyPr rtlCol="0" anchor="ctr"/>
-          <a:lstStyle/>
-          <a:p>
-            <a:pPr algn="ctr"/>
-            <a:r>
-              <a:rPr lang="ja-JP" altLang="en-US" dirty="0"/>
-              <a:t>正解確認</a:t>
-            </a:r>
-            <a:r>
-              <a:rPr kumimoji="1" lang="ja-JP" altLang="en-US" dirty="0"/>
-              <a:t>画面</a:t>
-            </a:r>
-          </a:p>
-        </p:txBody>
-      </p:sp>
-      <p:sp>
-        <p:nvSpPr>
-          <p:cNvPr id="8" name="楕円 7">
-            <a:extLst>
-              <a:ext uri="{FF2B5EF4-FFF2-40B4-BE49-F238E27FC236}">
-                <a16:creationId xmlns:a16="http://schemas.microsoft.com/office/drawing/2014/main" id="{B552B3A3-A8FA-26C6-2C6A-8698363D668D}"/>
-              </a:ext>
-            </a:extLst>
-          </p:cNvPr>
-          <p:cNvSpPr/>
-          <p:nvPr/>
-        </p:nvSpPr>
-        <p:spPr>
-          <a:xfrm>
-            <a:off x="3566474" y="3923901"/>
-            <a:ext cx="1505147" cy="1027521"/>
-          </a:xfrm>
-          <a:prstGeom prst="ellipse">
-            <a:avLst/>
-          </a:prstGeom>
-          <a:ln w="28575">
-            <a:solidFill>
-              <a:schemeClr val="tx1"/>
-            </a:solidFill>
-          </a:ln>
-        </p:spPr>
-        <p:style>
-          <a:lnRef idx="2">
-            <a:schemeClr val="accent6"/>
-          </a:lnRef>
-          <a:fillRef idx="1">
-            <a:schemeClr val="lt1"/>
-          </a:fillRef>
-          <a:effectRef idx="0">
-            <a:schemeClr val="accent6"/>
-          </a:effectRef>
-          <a:fontRef idx="minor">
-            <a:schemeClr val="dk1"/>
-          </a:fontRef>
-        </p:style>
-        <p:txBody>
-          <a:bodyPr rtlCol="0" anchor="ctr"/>
-          <a:lstStyle/>
-          <a:p>
-            <a:pPr algn="ctr"/>
-            <a:r>
-              <a:rPr lang="ja-JP" altLang="en-US" dirty="0"/>
-              <a:t>クイズ</a:t>
-            </a:r>
-            <a:r>
-              <a:rPr kumimoji="1" lang="ja-JP" altLang="en-US" dirty="0"/>
-              <a:t>画面</a:t>
-            </a:r>
-          </a:p>
-        </p:txBody>
-      </p:sp>
-      <p:cxnSp>
-        <p:nvCxnSpPr>
-          <p:cNvPr id="20" name="コネクタ: 曲線 19">
-            <a:extLst>
-              <a:ext uri="{FF2B5EF4-FFF2-40B4-BE49-F238E27FC236}">
-                <a16:creationId xmlns:a16="http://schemas.microsoft.com/office/drawing/2014/main" id="{11A0BF3F-A699-C20A-8B8A-C21DE6788FE9}"/>
-              </a:ext>
-            </a:extLst>
-          </p:cNvPr>
-          <p:cNvCxnSpPr>
-            <a:cxnSpLocks/>
-            <a:stCxn id="4" idx="5"/>
-            <a:endCxn id="2" idx="3"/>
-          </p:cNvCxnSpPr>
-          <p:nvPr/>
-        </p:nvCxnSpPr>
-        <p:spPr>
-          <a:xfrm rot="16200000" flipH="1">
-            <a:off x="4225262" y="535191"/>
-            <a:ext cx="12700" cy="1871480"/>
-          </a:xfrm>
-          <a:prstGeom prst="curvedConnector3">
-            <a:avLst>
-              <a:gd name="adj1" fmla="val 2984858"/>
-            </a:avLst>
-          </a:prstGeom>
-          <a:ln w="28575">
-            <a:solidFill>
-              <a:schemeClr val="tx1"/>
-            </a:solidFill>
-            <a:tailEnd type="triangle"/>
-          </a:ln>
-        </p:spPr>
-        <p:style>
-          <a:lnRef idx="1">
-            <a:schemeClr val="dk1"/>
-          </a:lnRef>
-          <a:fillRef idx="0">
-            <a:schemeClr val="dk1"/>
-          </a:fillRef>
-          <a:effectRef idx="0">
-            <a:schemeClr val="dk1"/>
-          </a:effectRef>
-          <a:fontRef idx="minor">
-            <a:schemeClr val="tx1"/>
-          </a:fontRef>
-        </p:style>
-      </p:cxnSp>
-      <p:cxnSp>
-        <p:nvCxnSpPr>
-          <p:cNvPr id="22" name="コネクタ: 曲線 21">
-            <a:extLst>
-              <a:ext uri="{FF2B5EF4-FFF2-40B4-BE49-F238E27FC236}">
-                <a16:creationId xmlns:a16="http://schemas.microsoft.com/office/drawing/2014/main" id="{7E114CF6-5A08-FC35-62B8-9187CE8491C0}"/>
-              </a:ext>
-            </a:extLst>
-          </p:cNvPr>
-          <p:cNvCxnSpPr>
-            <a:cxnSpLocks/>
-            <a:stCxn id="2" idx="1"/>
-            <a:endCxn id="4" idx="7"/>
-          </p:cNvCxnSpPr>
-          <p:nvPr/>
-        </p:nvCxnSpPr>
-        <p:spPr>
-          <a:xfrm rot="16200000" flipV="1">
-            <a:off x="4225262" y="-191376"/>
-            <a:ext cx="12700" cy="1871480"/>
-          </a:xfrm>
-          <a:prstGeom prst="curvedConnector3">
-            <a:avLst>
-              <a:gd name="adj1" fmla="val 2984858"/>
-            </a:avLst>
-          </a:prstGeom>
-          <a:ln w="28575">
-            <a:solidFill>
-              <a:schemeClr val="tx1"/>
-            </a:solidFill>
-            <a:tailEnd type="triangle"/>
-          </a:ln>
-        </p:spPr>
-        <p:style>
-          <a:lnRef idx="1">
-            <a:schemeClr val="dk1"/>
-          </a:lnRef>
-          <a:fillRef idx="0">
-            <a:schemeClr val="dk1"/>
-          </a:fillRef>
-          <a:effectRef idx="0">
-            <a:schemeClr val="dk1"/>
-          </a:effectRef>
-          <a:fontRef idx="minor">
-            <a:schemeClr val="tx1"/>
-          </a:fontRef>
-        </p:style>
-      </p:cxnSp>
-      <p:cxnSp>
-        <p:nvCxnSpPr>
-          <p:cNvPr id="25" name="コネクタ: 曲線 24">
-            <a:extLst>
-              <a:ext uri="{FF2B5EF4-FFF2-40B4-BE49-F238E27FC236}">
-                <a16:creationId xmlns:a16="http://schemas.microsoft.com/office/drawing/2014/main" id="{EF22FA37-1BE5-5891-3B31-6CD9560D45D3}"/>
-              </a:ext>
-            </a:extLst>
-          </p:cNvPr>
-          <p:cNvCxnSpPr>
-            <a:cxnSpLocks/>
-            <a:stCxn id="2" idx="5"/>
-            <a:endCxn id="3" idx="3"/>
-          </p:cNvCxnSpPr>
-          <p:nvPr/>
-        </p:nvCxnSpPr>
-        <p:spPr>
-          <a:xfrm rot="5400000" flipH="1" flipV="1">
-            <a:off x="7249225" y="402065"/>
-            <a:ext cx="140485" cy="1997248"/>
-          </a:xfrm>
-          <a:prstGeom prst="curvedConnector3">
-            <a:avLst>
-              <a:gd name="adj1" fmla="val -269835"/>
-            </a:avLst>
-          </a:prstGeom>
-          <a:ln w="28575">
-            <a:solidFill>
-              <a:schemeClr val="tx1"/>
-            </a:solidFill>
-            <a:tailEnd type="triangle"/>
-          </a:ln>
-        </p:spPr>
-        <p:style>
-          <a:lnRef idx="1">
-            <a:schemeClr val="dk1"/>
-          </a:lnRef>
-          <a:fillRef idx="0">
-            <a:schemeClr val="dk1"/>
-          </a:fillRef>
-          <a:effectRef idx="0">
-            <a:schemeClr val="dk1"/>
-          </a:effectRef>
-          <a:fontRef idx="minor">
-            <a:schemeClr val="tx1"/>
-          </a:fontRef>
-        </p:style>
-      </p:cxnSp>
-      <p:cxnSp>
-        <p:nvCxnSpPr>
-          <p:cNvPr id="33" name="コネクタ: 曲線 32">
-            <a:extLst>
-              <a:ext uri="{FF2B5EF4-FFF2-40B4-BE49-F238E27FC236}">
-                <a16:creationId xmlns:a16="http://schemas.microsoft.com/office/drawing/2014/main" id="{0F8D5CC5-AE26-B0CE-C333-99DE63FD22CE}"/>
-              </a:ext>
-            </a:extLst>
-          </p:cNvPr>
-          <p:cNvCxnSpPr>
-            <a:cxnSpLocks/>
-            <a:stCxn id="3" idx="1"/>
-            <a:endCxn id="2" idx="7"/>
-          </p:cNvCxnSpPr>
-          <p:nvPr/>
-        </p:nvCxnSpPr>
-        <p:spPr>
-          <a:xfrm rot="16200000" flipH="1" flipV="1">
-            <a:off x="7249225" y="-324503"/>
-            <a:ext cx="140485" cy="1997248"/>
-          </a:xfrm>
-          <a:prstGeom prst="curvedConnector3">
-            <a:avLst>
-              <a:gd name="adj1" fmla="val -269835"/>
-            </a:avLst>
-          </a:prstGeom>
-          <a:ln w="28575">
-            <a:solidFill>
-              <a:schemeClr val="tx1"/>
-            </a:solidFill>
-            <a:tailEnd type="triangle"/>
-          </a:ln>
-        </p:spPr>
-        <p:style>
-          <a:lnRef idx="1">
-            <a:schemeClr val="dk1"/>
-          </a:lnRef>
-          <a:fillRef idx="0">
-            <a:schemeClr val="dk1"/>
-          </a:fillRef>
-          <a:effectRef idx="0">
-            <a:schemeClr val="dk1"/>
-          </a:effectRef>
-          <a:fontRef idx="minor">
-            <a:schemeClr val="tx1"/>
-          </a:fontRef>
-        </p:style>
-      </p:cxnSp>
-      <p:cxnSp>
-        <p:nvCxnSpPr>
-          <p:cNvPr id="37" name="コネクタ: 曲線 36">
-            <a:extLst>
-              <a:ext uri="{FF2B5EF4-FFF2-40B4-BE49-F238E27FC236}">
-                <a16:creationId xmlns:a16="http://schemas.microsoft.com/office/drawing/2014/main" id="{3BC688B6-FD40-0294-E9A7-E4143E887EBC}"/>
-              </a:ext>
-            </a:extLst>
-          </p:cNvPr>
-          <p:cNvCxnSpPr>
-            <a:cxnSpLocks/>
-            <a:stCxn id="8" idx="5"/>
-            <a:endCxn id="7" idx="3"/>
-          </p:cNvCxnSpPr>
-          <p:nvPr/>
-        </p:nvCxnSpPr>
-        <p:spPr>
-          <a:xfrm rot="16200000" flipH="1">
-            <a:off x="5731963" y="3920178"/>
-            <a:ext cx="12700" cy="1761533"/>
-          </a:xfrm>
-          <a:prstGeom prst="curvedConnector3">
-            <a:avLst>
-              <a:gd name="adj1" fmla="val 2984858"/>
-            </a:avLst>
-          </a:prstGeom>
-          <a:ln w="28575">
-            <a:solidFill>
-              <a:schemeClr val="tx1"/>
-            </a:solidFill>
-            <a:tailEnd type="triangle"/>
-          </a:ln>
-        </p:spPr>
-        <p:style>
-          <a:lnRef idx="1">
-            <a:schemeClr val="dk1"/>
-          </a:lnRef>
-          <a:fillRef idx="0">
-            <a:schemeClr val="dk1"/>
-          </a:fillRef>
-          <a:effectRef idx="0">
-            <a:schemeClr val="dk1"/>
-          </a:effectRef>
-          <a:fontRef idx="minor">
-            <a:schemeClr val="tx1"/>
-          </a:fontRef>
-        </p:style>
-      </p:cxnSp>
-      <p:cxnSp>
-        <p:nvCxnSpPr>
-          <p:cNvPr id="42" name="コネクタ: 曲線 41">
-            <a:extLst>
-              <a:ext uri="{FF2B5EF4-FFF2-40B4-BE49-F238E27FC236}">
-                <a16:creationId xmlns:a16="http://schemas.microsoft.com/office/drawing/2014/main" id="{F76429CE-282C-960B-32E0-ADD809A8A9BE}"/>
-              </a:ext>
-            </a:extLst>
-          </p:cNvPr>
-          <p:cNvCxnSpPr>
-            <a:cxnSpLocks/>
-            <a:stCxn id="7" idx="1"/>
-            <a:endCxn id="8" idx="7"/>
-          </p:cNvCxnSpPr>
-          <p:nvPr/>
-        </p:nvCxnSpPr>
-        <p:spPr>
-          <a:xfrm rot="16200000" flipV="1">
-            <a:off x="5731964" y="3193611"/>
-            <a:ext cx="12700" cy="1761533"/>
-          </a:xfrm>
-          <a:prstGeom prst="curvedConnector3">
-            <a:avLst>
-              <a:gd name="adj1" fmla="val 2984858"/>
-            </a:avLst>
-          </a:prstGeom>
-          <a:ln w="28575">
-            <a:solidFill>
-              <a:schemeClr val="tx1"/>
-            </a:solidFill>
-            <a:tailEnd type="triangle"/>
-          </a:ln>
-        </p:spPr>
-        <p:style>
-          <a:lnRef idx="1">
-            <a:schemeClr val="dk1"/>
-          </a:lnRef>
-          <a:fillRef idx="0">
-            <a:schemeClr val="dk1"/>
-          </a:fillRef>
-          <a:effectRef idx="0">
-            <a:schemeClr val="dk1"/>
-          </a:effectRef>
-          <a:fontRef idx="minor">
-            <a:schemeClr val="tx1"/>
-          </a:fontRef>
-        </p:style>
-      </p:cxnSp>
-      <p:cxnSp>
-        <p:nvCxnSpPr>
-          <p:cNvPr id="46" name="直線矢印コネクタ 45">
-            <a:extLst>
-              <a:ext uri="{FF2B5EF4-FFF2-40B4-BE49-F238E27FC236}">
-                <a16:creationId xmlns:a16="http://schemas.microsoft.com/office/drawing/2014/main" id="{BB928206-F2BD-B8A1-EB8D-7C9DF7F75A75}"/>
-              </a:ext>
-            </a:extLst>
-          </p:cNvPr>
-          <p:cNvCxnSpPr>
-            <a:cxnSpLocks/>
-            <a:stCxn id="2" idx="4"/>
-            <a:endCxn id="5" idx="0"/>
-          </p:cNvCxnSpPr>
-          <p:nvPr/>
-        </p:nvCxnSpPr>
-        <p:spPr>
-          <a:xfrm flipH="1">
-            <a:off x="1831942" y="1621408"/>
-            <a:ext cx="3908981" cy="2284340"/>
-          </a:xfrm>
-          <a:prstGeom prst="straightConnector1">
-            <a:avLst/>
-          </a:prstGeom>
-          <a:ln w="28575">
-            <a:tailEnd type="triangle"/>
-          </a:ln>
-        </p:spPr>
-        <p:style>
-          <a:lnRef idx="1">
-            <a:schemeClr val="dk1"/>
-          </a:lnRef>
-          <a:fillRef idx="0">
-            <a:schemeClr val="dk1"/>
-          </a:fillRef>
-          <a:effectRef idx="0">
-            <a:schemeClr val="dk1"/>
-          </a:effectRef>
-          <a:fontRef idx="minor">
-            <a:schemeClr val="tx1"/>
-          </a:fontRef>
-        </p:style>
-      </p:cxnSp>
-      <p:cxnSp>
-        <p:nvCxnSpPr>
-          <p:cNvPr id="50" name="直線矢印コネクタ 49">
-            <a:extLst>
-              <a:ext uri="{FF2B5EF4-FFF2-40B4-BE49-F238E27FC236}">
-                <a16:creationId xmlns:a16="http://schemas.microsoft.com/office/drawing/2014/main" id="{43A1E541-5E37-4FEA-D7FE-4164054A3E4B}"/>
-              </a:ext>
-            </a:extLst>
-          </p:cNvPr>
-          <p:cNvCxnSpPr>
-            <a:cxnSpLocks/>
-            <a:stCxn id="5" idx="6"/>
-            <a:endCxn id="8" idx="2"/>
-          </p:cNvCxnSpPr>
-          <p:nvPr/>
-        </p:nvCxnSpPr>
-        <p:spPr>
-          <a:xfrm>
-            <a:off x="2652074" y="4419509"/>
-            <a:ext cx="914400" cy="18153"/>
-          </a:xfrm>
-          <a:prstGeom prst="straightConnector1">
-            <a:avLst/>
-          </a:prstGeom>
-          <a:ln w="28575">
-            <a:tailEnd type="triangle"/>
-          </a:ln>
-        </p:spPr>
-        <p:style>
-          <a:lnRef idx="1">
-            <a:schemeClr val="dk1"/>
-          </a:lnRef>
-          <a:fillRef idx="0">
-            <a:schemeClr val="dk1"/>
-          </a:fillRef>
-          <a:effectRef idx="0">
-            <a:schemeClr val="dk1"/>
-          </a:effectRef>
-          <a:fontRef idx="minor">
-            <a:schemeClr val="tx1"/>
-          </a:fontRef>
-        </p:style>
-      </p:cxnSp>
-      <p:cxnSp>
-        <p:nvCxnSpPr>
-          <p:cNvPr id="53" name="直線矢印コネクタ 52">
-            <a:extLst>
-              <a:ext uri="{FF2B5EF4-FFF2-40B4-BE49-F238E27FC236}">
-                <a16:creationId xmlns:a16="http://schemas.microsoft.com/office/drawing/2014/main" id="{9D03604F-AB52-5858-92DC-4D461565D125}"/>
-              </a:ext>
-            </a:extLst>
-          </p:cNvPr>
-          <p:cNvCxnSpPr>
-            <a:cxnSpLocks/>
-            <a:stCxn id="7" idx="6"/>
-            <a:endCxn id="6" idx="2"/>
-          </p:cNvCxnSpPr>
-          <p:nvPr/>
-        </p:nvCxnSpPr>
-        <p:spPr>
-          <a:xfrm>
-            <a:off x="8012783" y="4437662"/>
-            <a:ext cx="885230" cy="0"/>
-          </a:xfrm>
-          <a:prstGeom prst="straightConnector1">
-            <a:avLst/>
-          </a:prstGeom>
-          <a:ln w="28575">
-            <a:tailEnd type="triangle"/>
-          </a:ln>
-        </p:spPr>
-        <p:style>
-          <a:lnRef idx="1">
-            <a:schemeClr val="dk1"/>
-          </a:lnRef>
-          <a:fillRef idx="0">
-            <a:schemeClr val="dk1"/>
-          </a:fillRef>
-          <a:effectRef idx="0">
-            <a:schemeClr val="dk1"/>
-          </a:effectRef>
-          <a:fontRef idx="minor">
-            <a:schemeClr val="tx1"/>
-          </a:fontRef>
-        </p:style>
-      </p:cxnSp>
-      <p:cxnSp>
-        <p:nvCxnSpPr>
-          <p:cNvPr id="56" name="コネクタ: 曲線 55">
-            <a:extLst>
-              <a:ext uri="{FF2B5EF4-FFF2-40B4-BE49-F238E27FC236}">
-                <a16:creationId xmlns:a16="http://schemas.microsoft.com/office/drawing/2014/main" id="{F33D45A3-14C0-805F-1018-BC45CFF56D3B}"/>
-              </a:ext>
-            </a:extLst>
-          </p:cNvPr>
-          <p:cNvCxnSpPr>
-            <a:cxnSpLocks/>
-            <a:stCxn id="6" idx="4"/>
-            <a:endCxn id="5" idx="4"/>
-          </p:cNvCxnSpPr>
-          <p:nvPr/>
-        </p:nvCxnSpPr>
-        <p:spPr>
-          <a:xfrm rot="5400000" flipH="1">
-            <a:off x="5765967" y="999245"/>
-            <a:ext cx="18153" cy="7886203"/>
-          </a:xfrm>
-          <a:prstGeom prst="curvedConnector3">
-            <a:avLst>
-              <a:gd name="adj1" fmla="val -4738589"/>
-            </a:avLst>
-          </a:prstGeom>
-          <a:ln w="28575">
-            <a:solidFill>
-              <a:schemeClr val="tx1"/>
-            </a:solidFill>
-            <a:tailEnd type="triangle"/>
-          </a:ln>
-        </p:spPr>
-        <p:style>
-          <a:lnRef idx="1">
-            <a:schemeClr val="dk1"/>
-          </a:lnRef>
-          <a:fillRef idx="0">
-            <a:schemeClr val="dk1"/>
-          </a:fillRef>
-          <a:effectRef idx="0">
-            <a:schemeClr val="dk1"/>
-          </a:effectRef>
-          <a:fontRef idx="minor">
-            <a:schemeClr val="tx1"/>
-          </a:fontRef>
-        </p:style>
-      </p:cxnSp>
-      <p:cxnSp>
-        <p:nvCxnSpPr>
-          <p:cNvPr id="81" name="直線矢印コネクタ 80">
-            <a:extLst>
-              <a:ext uri="{FF2B5EF4-FFF2-40B4-BE49-F238E27FC236}">
-                <a16:creationId xmlns:a16="http://schemas.microsoft.com/office/drawing/2014/main" id="{8A9655FA-AB0A-75B3-4E3C-08F564738AB1}"/>
-              </a:ext>
-            </a:extLst>
-          </p:cNvPr>
-          <p:cNvCxnSpPr>
-            <a:cxnSpLocks/>
-            <a:stCxn id="6" idx="0"/>
-            <a:endCxn id="2" idx="4"/>
-          </p:cNvCxnSpPr>
-          <p:nvPr/>
-        </p:nvCxnSpPr>
-        <p:spPr>
-          <a:xfrm flipH="1" flipV="1">
-            <a:off x="5740923" y="1621408"/>
-            <a:ext cx="3977222" cy="2302493"/>
-          </a:xfrm>
-          <a:prstGeom prst="straightConnector1">
-            <a:avLst/>
-          </a:prstGeom>
-          <a:ln w="28575">
-            <a:tailEnd type="triangle"/>
-          </a:ln>
-        </p:spPr>
-        <p:style>
-          <a:lnRef idx="1">
-            <a:schemeClr val="dk1"/>
-          </a:lnRef>
-          <a:fillRef idx="0">
-            <a:schemeClr val="dk1"/>
-          </a:fillRef>
-          <a:effectRef idx="0">
-            <a:schemeClr val="dk1"/>
-          </a:effectRef>
-          <a:fontRef idx="minor">
-            <a:schemeClr val="tx1"/>
-          </a:fontRef>
-        </p:style>
-      </p:cxnSp>
-      <p:cxnSp>
-        <p:nvCxnSpPr>
-          <p:cNvPr id="90" name="コネクタ: 曲線 89">
-            <a:extLst>
-              <a:ext uri="{FF2B5EF4-FFF2-40B4-BE49-F238E27FC236}">
-                <a16:creationId xmlns:a16="http://schemas.microsoft.com/office/drawing/2014/main" id="{D79A2586-E404-CDD3-E13C-CD52C0F64CEB}"/>
-              </a:ext>
-            </a:extLst>
-          </p:cNvPr>
-          <p:cNvCxnSpPr>
-            <a:cxnSpLocks/>
-            <a:stCxn id="6" idx="4"/>
-            <a:endCxn id="8" idx="4"/>
-          </p:cNvCxnSpPr>
-          <p:nvPr/>
-        </p:nvCxnSpPr>
-        <p:spPr>
-          <a:xfrm rot="5400000">
-            <a:off x="7018597" y="2251874"/>
-            <a:ext cx="12700" cy="5399097"/>
-          </a:xfrm>
-          <a:prstGeom prst="curvedConnector3">
-            <a:avLst>
-              <a:gd name="adj1" fmla="val 4175260"/>
-            </a:avLst>
-          </a:prstGeom>
-          <a:ln w="28575">
-            <a:solidFill>
-              <a:schemeClr val="tx1"/>
-            </a:solidFill>
-            <a:tailEnd type="triangle"/>
-          </a:ln>
-        </p:spPr>
-        <p:style>
-          <a:lnRef idx="1">
-            <a:schemeClr val="dk1"/>
-          </a:lnRef>
-          <a:fillRef idx="0">
-            <a:schemeClr val="dk1"/>
-          </a:fillRef>
-          <a:effectRef idx="0">
-            <a:schemeClr val="dk1"/>
-          </a:effectRef>
-          <a:fontRef idx="minor">
-            <a:schemeClr val="tx1"/>
-          </a:fontRef>
-        </p:style>
-      </p:cxnSp>
+              <a:t>タイトルへ戻るボタン</a:t>
+            </a:r>
+            <a:endParaRPr kumimoji="1" lang="ja-JP" altLang="en-US" dirty="0"/>
+          </a:p>
+        </p:txBody>
+      </p:sp>
     </p:spTree>
     <p:extLst>
       <p:ext uri="{BB962C8B-B14F-4D97-AF65-F5344CB8AC3E}">
-        <p14:creationId xmlns:p14="http://schemas.microsoft.com/office/powerpoint/2010/main" val="516124947"/>
+        <p14:creationId xmlns:p14="http://schemas.microsoft.com/office/powerpoint/2010/main" val="3648224866"/>
       </p:ext>
     </p:extLst>
   </p:cSld>
@@ -7164,151 +6419,960 @@
       </p:grpSpPr>
       <p:sp>
         <p:nvSpPr>
-          <p:cNvPr id="2" name="テキスト ボックス 1">
-            <a:extLst>
-              <a:ext uri="{FF2B5EF4-FFF2-40B4-BE49-F238E27FC236}">
-                <a16:creationId xmlns:a16="http://schemas.microsoft.com/office/drawing/2014/main" id="{21B82B96-5316-0995-B946-BFDEB437F778}"/>
-              </a:ext>
-            </a:extLst>
-          </p:cNvPr>
-          <p:cNvSpPr txBox="1"/>
+          <p:cNvPr id="2" name="楕円 1">
+            <a:extLst>
+              <a:ext uri="{FF2B5EF4-FFF2-40B4-BE49-F238E27FC236}">
+                <a16:creationId xmlns:a16="http://schemas.microsoft.com/office/drawing/2014/main" id="{39AF3BCB-5E0D-8E5B-DE79-35909C8C0308}"/>
+              </a:ext>
+            </a:extLst>
+          </p:cNvPr>
+          <p:cNvSpPr/>
           <p:nvPr/>
         </p:nvSpPr>
         <p:spPr>
           <a:xfrm>
-            <a:off x="906542" y="1084033"/>
-            <a:ext cx="9725527" cy="5262979"/>
-          </a:xfrm>
-          <a:prstGeom prst="rect">
+            <a:off x="4920791" y="593887"/>
+            <a:ext cx="1640264" cy="1027521"/>
+          </a:xfrm>
+          <a:prstGeom prst="ellipse">
             <a:avLst/>
           </a:prstGeom>
-          <a:noFill/>
-        </p:spPr>
-        <p:txBody>
-          <a:bodyPr wrap="square" rtlCol="0">
-            <a:spAutoFit/>
-          </a:bodyPr>
-          <a:lstStyle/>
-          <a:p>
-            <a:pPr marL="457200" indent="-457200">
-              <a:buFont typeface="Arial" panose="020B0604020202020204" pitchFamily="34" charset="0"/>
-              <a:buChar char="•"/>
-            </a:pPr>
-            <a:r>
-              <a:rPr lang="ja-JP" altLang="en-US" sz="2800" dirty="0"/>
-              <a:t>再配布禁止な音楽素材がプログラム起動時にあるかどうかを判定して、ない場合は音楽をなくす機能</a:t>
-            </a:r>
-            <a:endParaRPr lang="en-US" altLang="ja-JP" sz="2800" dirty="0"/>
-          </a:p>
-          <a:p>
-            <a:pPr marL="457200" indent="-457200">
-              <a:buFont typeface="Arial" panose="020B0604020202020204" pitchFamily="34" charset="0"/>
-              <a:buChar char="•"/>
-            </a:pPr>
-            <a:r>
-              <a:rPr lang="ja-JP" altLang="en-US" sz="2800" dirty="0"/>
-              <a:t>クイズを解くときの音楽の設定（</a:t>
-            </a:r>
-            <a:r>
-              <a:rPr lang="en-US" altLang="ja-JP" sz="2800" dirty="0"/>
-              <a:t>sound</a:t>
-            </a:r>
-            <a:r>
-              <a:rPr lang="ja-JP" altLang="en-US" sz="2800" dirty="0"/>
-              <a:t>フォルダに事前に入れておけば選択できるようにする）</a:t>
-            </a:r>
-            <a:endParaRPr lang="en-US" altLang="ja-JP" sz="2800" dirty="0"/>
-          </a:p>
-          <a:p>
-            <a:pPr marL="457200" indent="-457200">
-              <a:buFont typeface="Arial" panose="020B0604020202020204" pitchFamily="34" charset="0"/>
-              <a:buChar char="•"/>
-            </a:pPr>
-            <a:r>
-              <a:rPr lang="ja-JP" altLang="en-US" sz="2800" dirty="0"/>
-              <a:t>問題文や解説文の大きさに合わせて表の縦幅や横幅を調節できる機能</a:t>
-            </a:r>
-            <a:endParaRPr lang="en-US" altLang="ja-JP" sz="2800" dirty="0"/>
-          </a:p>
-          <a:p>
-            <a:pPr marL="457200" indent="-457200">
-              <a:buFont typeface="Arial" panose="020B0604020202020204" pitchFamily="34" charset="0"/>
-              <a:buChar char="•"/>
-            </a:pPr>
-            <a:r>
-              <a:rPr lang="ja-JP" altLang="en-US" sz="2800" dirty="0"/>
-              <a:t>背景画像の追加</a:t>
-            </a:r>
-            <a:endParaRPr lang="en-US" altLang="ja-JP" sz="2800" dirty="0"/>
-          </a:p>
-          <a:p>
-            <a:pPr marL="457200" indent="-457200">
-              <a:buFont typeface="Arial" panose="020B0604020202020204" pitchFamily="34" charset="0"/>
-              <a:buChar char="•"/>
-            </a:pPr>
-            <a:r>
-              <a:rPr lang="en-US" altLang="ja-JP" sz="2800" dirty="0"/>
-              <a:t>Python </a:t>
-            </a:r>
-            <a:r>
-              <a:rPr lang="ja-JP" altLang="en-US" sz="2800" dirty="0"/>
-              <a:t>の文章の差分を計算するモジュールを用いて、間違い部分だけを赤字で出力する</a:t>
-            </a:r>
-            <a:endParaRPr lang="en-US" altLang="ja-JP" sz="2800" dirty="0"/>
-          </a:p>
-          <a:p>
-            <a:pPr marL="457200" indent="-457200">
-              <a:buFont typeface="Arial" panose="020B0604020202020204" pitchFamily="34" charset="0"/>
-              <a:buChar char="•"/>
-            </a:pPr>
-            <a:r>
-              <a:rPr lang="ja-JP" altLang="en-US" sz="2800" dirty="0"/>
-              <a:t>画面のサイズが動かないように固定する（現状画面ごとにサイズが変わったり、一度マウスでサイズを変えると、そのサイズに固定されたりしている）</a:t>
-            </a:r>
-            <a:endParaRPr lang="en-US" altLang="ja-JP" sz="2800" dirty="0"/>
-          </a:p>
-        </p:txBody>
-      </p:sp>
-      <p:sp>
-        <p:nvSpPr>
-          <p:cNvPr id="3" name="テキスト ボックス 2">
-            <a:extLst>
-              <a:ext uri="{FF2B5EF4-FFF2-40B4-BE49-F238E27FC236}">
-                <a16:creationId xmlns:a16="http://schemas.microsoft.com/office/drawing/2014/main" id="{419620DA-EE65-F488-8D27-C3D68A7FC8E9}"/>
-              </a:ext>
-            </a:extLst>
-          </p:cNvPr>
-          <p:cNvSpPr txBox="1"/>
+          <a:ln w="28575">
+            <a:solidFill>
+              <a:schemeClr val="tx1"/>
+            </a:solidFill>
+          </a:ln>
+        </p:spPr>
+        <p:style>
+          <a:lnRef idx="2">
+            <a:schemeClr val="accent6"/>
+          </a:lnRef>
+          <a:fillRef idx="1">
+            <a:schemeClr val="lt1"/>
+          </a:fillRef>
+          <a:effectRef idx="0">
+            <a:schemeClr val="accent6"/>
+          </a:effectRef>
+          <a:fontRef idx="minor">
+            <a:schemeClr val="dk1"/>
+          </a:fontRef>
+        </p:style>
+        <p:txBody>
+          <a:bodyPr rtlCol="0" anchor="ctr"/>
+          <a:lstStyle/>
+          <a:p>
+            <a:pPr algn="ctr"/>
+            <a:r>
+              <a:rPr kumimoji="1" lang="ja-JP" altLang="en-US" dirty="0"/>
+              <a:t>タイトル画面</a:t>
+            </a:r>
+          </a:p>
+        </p:txBody>
+      </p:sp>
+      <p:sp>
+        <p:nvSpPr>
+          <p:cNvPr id="3" name="楕円 2">
+            <a:extLst>
+              <a:ext uri="{FF2B5EF4-FFF2-40B4-BE49-F238E27FC236}">
+                <a16:creationId xmlns:a16="http://schemas.microsoft.com/office/drawing/2014/main" id="{8EF062F2-90EE-6847-E171-CEF93D24BF97}"/>
+              </a:ext>
+            </a:extLst>
+          </p:cNvPr>
+          <p:cNvSpPr/>
           <p:nvPr/>
         </p:nvSpPr>
         <p:spPr>
           <a:xfrm>
-            <a:off x="489284" y="159792"/>
-            <a:ext cx="5606716" cy="646331"/>
-          </a:xfrm>
-          <a:prstGeom prst="rect">
+            <a:off x="8077881" y="453402"/>
+            <a:ext cx="1640264" cy="1027521"/>
+          </a:xfrm>
+          <a:prstGeom prst="ellipse">
             <a:avLst/>
           </a:prstGeom>
-          <a:noFill/>
-        </p:spPr>
-        <p:txBody>
-          <a:bodyPr wrap="square" rtlCol="0">
-            <a:spAutoFit/>
-          </a:bodyPr>
-          <a:lstStyle/>
-          <a:p>
-            <a:r>
-              <a:rPr kumimoji="1" lang="ja-JP" altLang="en-US" sz="3600" b="1" dirty="0"/>
-              <a:t>欲しい追加機能</a:t>
-            </a:r>
-            <a:endParaRPr kumimoji="1" lang="en-US" altLang="ja-JP" sz="3600" b="1" dirty="0"/>
-          </a:p>
-        </p:txBody>
-      </p:sp>
+          <a:ln w="28575">
+            <a:solidFill>
+              <a:schemeClr val="tx1"/>
+            </a:solidFill>
+          </a:ln>
+        </p:spPr>
+        <p:style>
+          <a:lnRef idx="2">
+            <a:schemeClr val="accent6"/>
+          </a:lnRef>
+          <a:fillRef idx="1">
+            <a:schemeClr val="lt1"/>
+          </a:fillRef>
+          <a:effectRef idx="0">
+            <a:schemeClr val="accent6"/>
+          </a:effectRef>
+          <a:fontRef idx="minor">
+            <a:schemeClr val="dk1"/>
+          </a:fontRef>
+        </p:style>
+        <p:txBody>
+          <a:bodyPr rtlCol="0" anchor="ctr"/>
+          <a:lstStyle/>
+          <a:p>
+            <a:pPr algn="ctr"/>
+            <a:r>
+              <a:rPr lang="ja-JP" altLang="en-US" dirty="0"/>
+              <a:t>ログ</a:t>
+            </a:r>
+            <a:r>
+              <a:rPr kumimoji="1" lang="ja-JP" altLang="en-US" dirty="0"/>
+              <a:t>画面</a:t>
+            </a:r>
+          </a:p>
+        </p:txBody>
+      </p:sp>
+      <p:sp>
+        <p:nvSpPr>
+          <p:cNvPr id="4" name="楕円 3">
+            <a:extLst>
+              <a:ext uri="{FF2B5EF4-FFF2-40B4-BE49-F238E27FC236}">
+                <a16:creationId xmlns:a16="http://schemas.microsoft.com/office/drawing/2014/main" id="{12A27FF8-FA3A-1306-2566-AA803F9AE303}"/>
+              </a:ext>
+            </a:extLst>
+          </p:cNvPr>
+          <p:cNvSpPr/>
+          <p:nvPr/>
+        </p:nvSpPr>
+        <p:spPr>
+          <a:xfrm>
+            <a:off x="1638693" y="593887"/>
+            <a:ext cx="1934066" cy="1027521"/>
+          </a:xfrm>
+          <a:prstGeom prst="ellipse">
+            <a:avLst/>
+          </a:prstGeom>
+          <a:ln w="28575">
+            <a:solidFill>
+              <a:schemeClr val="tx1"/>
+            </a:solidFill>
+          </a:ln>
+        </p:spPr>
+        <p:style>
+          <a:lnRef idx="2">
+            <a:schemeClr val="accent6"/>
+          </a:lnRef>
+          <a:fillRef idx="1">
+            <a:schemeClr val="lt1"/>
+          </a:fillRef>
+          <a:effectRef idx="0">
+            <a:schemeClr val="accent6"/>
+          </a:effectRef>
+          <a:fontRef idx="minor">
+            <a:schemeClr val="dk1"/>
+          </a:fontRef>
+        </p:style>
+        <p:txBody>
+          <a:bodyPr rtlCol="0" anchor="ctr"/>
+          <a:lstStyle/>
+          <a:p>
+            <a:pPr algn="ctr"/>
+            <a:r>
+              <a:rPr lang="en-US" altLang="ja-JP" dirty="0"/>
+              <a:t>(Windows </a:t>
+            </a:r>
+            <a:r>
+              <a:rPr lang="ja-JP" altLang="en-US" dirty="0"/>
+              <a:t>のみ</a:t>
+            </a:r>
+            <a:r>
+              <a:rPr lang="en-US" altLang="ja-JP" dirty="0"/>
+              <a:t>)</a:t>
+            </a:r>
+            <a:r>
+              <a:rPr lang="ja-JP" altLang="en-US" dirty="0"/>
+              <a:t>音声設定</a:t>
+            </a:r>
+            <a:r>
+              <a:rPr kumimoji="1" lang="ja-JP" altLang="en-US" dirty="0"/>
+              <a:t>画面</a:t>
+            </a:r>
+          </a:p>
+        </p:txBody>
+      </p:sp>
+      <p:sp>
+        <p:nvSpPr>
+          <p:cNvPr id="5" name="楕円 4">
+            <a:extLst>
+              <a:ext uri="{FF2B5EF4-FFF2-40B4-BE49-F238E27FC236}">
+                <a16:creationId xmlns:a16="http://schemas.microsoft.com/office/drawing/2014/main" id="{B7241839-DFA3-6712-54BC-3EF846853E09}"/>
+              </a:ext>
+            </a:extLst>
+          </p:cNvPr>
+          <p:cNvSpPr/>
+          <p:nvPr/>
+        </p:nvSpPr>
+        <p:spPr>
+          <a:xfrm>
+            <a:off x="1011810" y="3905748"/>
+            <a:ext cx="1640264" cy="1027521"/>
+          </a:xfrm>
+          <a:prstGeom prst="ellipse">
+            <a:avLst/>
+          </a:prstGeom>
+          <a:ln w="28575">
+            <a:solidFill>
+              <a:schemeClr val="tx1"/>
+            </a:solidFill>
+          </a:ln>
+        </p:spPr>
+        <p:style>
+          <a:lnRef idx="2">
+            <a:schemeClr val="accent6"/>
+          </a:lnRef>
+          <a:fillRef idx="1">
+            <a:schemeClr val="lt1"/>
+          </a:fillRef>
+          <a:effectRef idx="0">
+            <a:schemeClr val="accent6"/>
+          </a:effectRef>
+          <a:fontRef idx="minor">
+            <a:schemeClr val="dk1"/>
+          </a:fontRef>
+        </p:style>
+        <p:txBody>
+          <a:bodyPr rtlCol="0" anchor="ctr"/>
+          <a:lstStyle/>
+          <a:p>
+            <a:pPr algn="ctr"/>
+            <a:r>
+              <a:rPr lang="ja-JP" altLang="en-US" dirty="0"/>
+              <a:t>問題選択</a:t>
+            </a:r>
+            <a:r>
+              <a:rPr kumimoji="1" lang="ja-JP" altLang="en-US" dirty="0"/>
+              <a:t>画面</a:t>
+            </a:r>
+          </a:p>
+        </p:txBody>
+      </p:sp>
+      <p:sp>
+        <p:nvSpPr>
+          <p:cNvPr id="6" name="楕円 5">
+            <a:extLst>
+              <a:ext uri="{FF2B5EF4-FFF2-40B4-BE49-F238E27FC236}">
+                <a16:creationId xmlns:a16="http://schemas.microsoft.com/office/drawing/2014/main" id="{ECF0B877-C8BC-EB03-59A1-6EBB91370F37}"/>
+              </a:ext>
+            </a:extLst>
+          </p:cNvPr>
+          <p:cNvSpPr/>
+          <p:nvPr/>
+        </p:nvSpPr>
+        <p:spPr>
+          <a:xfrm>
+            <a:off x="8898013" y="3923901"/>
+            <a:ext cx="1640264" cy="1027521"/>
+          </a:xfrm>
+          <a:prstGeom prst="ellipse">
+            <a:avLst/>
+          </a:prstGeom>
+          <a:ln w="28575">
+            <a:solidFill>
+              <a:schemeClr val="tx1"/>
+            </a:solidFill>
+          </a:ln>
+        </p:spPr>
+        <p:style>
+          <a:lnRef idx="2">
+            <a:schemeClr val="accent6"/>
+          </a:lnRef>
+          <a:fillRef idx="1">
+            <a:schemeClr val="lt1"/>
+          </a:fillRef>
+          <a:effectRef idx="0">
+            <a:schemeClr val="accent6"/>
+          </a:effectRef>
+          <a:fontRef idx="minor">
+            <a:schemeClr val="dk1"/>
+          </a:fontRef>
+        </p:style>
+        <p:txBody>
+          <a:bodyPr rtlCol="0" anchor="ctr"/>
+          <a:lstStyle/>
+          <a:p>
+            <a:pPr algn="ctr"/>
+            <a:r>
+              <a:rPr kumimoji="1" lang="ja-JP" altLang="en-US" dirty="0"/>
+              <a:t>結果画面</a:t>
+            </a:r>
+          </a:p>
+        </p:txBody>
+      </p:sp>
+      <p:sp>
+        <p:nvSpPr>
+          <p:cNvPr id="7" name="楕円 6">
+            <a:extLst>
+              <a:ext uri="{FF2B5EF4-FFF2-40B4-BE49-F238E27FC236}">
+                <a16:creationId xmlns:a16="http://schemas.microsoft.com/office/drawing/2014/main" id="{BBA5039E-DFFC-2C22-303B-23F4E2CAF39B}"/>
+              </a:ext>
+            </a:extLst>
+          </p:cNvPr>
+          <p:cNvSpPr/>
+          <p:nvPr/>
+        </p:nvSpPr>
+        <p:spPr>
+          <a:xfrm>
+            <a:off x="6372519" y="3923901"/>
+            <a:ext cx="1640264" cy="1027521"/>
+          </a:xfrm>
+          <a:prstGeom prst="ellipse">
+            <a:avLst/>
+          </a:prstGeom>
+          <a:ln w="28575">
+            <a:solidFill>
+              <a:schemeClr val="tx1"/>
+            </a:solidFill>
+          </a:ln>
+        </p:spPr>
+        <p:style>
+          <a:lnRef idx="2">
+            <a:schemeClr val="accent6"/>
+          </a:lnRef>
+          <a:fillRef idx="1">
+            <a:schemeClr val="lt1"/>
+          </a:fillRef>
+          <a:effectRef idx="0">
+            <a:schemeClr val="accent6"/>
+          </a:effectRef>
+          <a:fontRef idx="minor">
+            <a:schemeClr val="dk1"/>
+          </a:fontRef>
+        </p:style>
+        <p:txBody>
+          <a:bodyPr rtlCol="0" anchor="ctr"/>
+          <a:lstStyle/>
+          <a:p>
+            <a:pPr algn="ctr"/>
+            <a:r>
+              <a:rPr lang="ja-JP" altLang="en-US" dirty="0"/>
+              <a:t>正解確認</a:t>
+            </a:r>
+            <a:r>
+              <a:rPr kumimoji="1" lang="ja-JP" altLang="en-US" dirty="0"/>
+              <a:t>画面</a:t>
+            </a:r>
+          </a:p>
+        </p:txBody>
+      </p:sp>
+      <p:sp>
+        <p:nvSpPr>
+          <p:cNvPr id="8" name="楕円 7">
+            <a:extLst>
+              <a:ext uri="{FF2B5EF4-FFF2-40B4-BE49-F238E27FC236}">
+                <a16:creationId xmlns:a16="http://schemas.microsoft.com/office/drawing/2014/main" id="{B552B3A3-A8FA-26C6-2C6A-8698363D668D}"/>
+              </a:ext>
+            </a:extLst>
+          </p:cNvPr>
+          <p:cNvSpPr/>
+          <p:nvPr/>
+        </p:nvSpPr>
+        <p:spPr>
+          <a:xfrm>
+            <a:off x="3566474" y="3923901"/>
+            <a:ext cx="1505147" cy="1027521"/>
+          </a:xfrm>
+          <a:prstGeom prst="ellipse">
+            <a:avLst/>
+          </a:prstGeom>
+          <a:ln w="28575">
+            <a:solidFill>
+              <a:schemeClr val="tx1"/>
+            </a:solidFill>
+          </a:ln>
+        </p:spPr>
+        <p:style>
+          <a:lnRef idx="2">
+            <a:schemeClr val="accent6"/>
+          </a:lnRef>
+          <a:fillRef idx="1">
+            <a:schemeClr val="lt1"/>
+          </a:fillRef>
+          <a:effectRef idx="0">
+            <a:schemeClr val="accent6"/>
+          </a:effectRef>
+          <a:fontRef idx="minor">
+            <a:schemeClr val="dk1"/>
+          </a:fontRef>
+        </p:style>
+        <p:txBody>
+          <a:bodyPr rtlCol="0" anchor="ctr"/>
+          <a:lstStyle/>
+          <a:p>
+            <a:pPr algn="ctr"/>
+            <a:r>
+              <a:rPr lang="ja-JP" altLang="en-US" dirty="0"/>
+              <a:t>クイズ</a:t>
+            </a:r>
+            <a:r>
+              <a:rPr kumimoji="1" lang="ja-JP" altLang="en-US" dirty="0"/>
+              <a:t>画面</a:t>
+            </a:r>
+          </a:p>
+        </p:txBody>
+      </p:sp>
+      <p:cxnSp>
+        <p:nvCxnSpPr>
+          <p:cNvPr id="20" name="コネクタ: 曲線 19">
+            <a:extLst>
+              <a:ext uri="{FF2B5EF4-FFF2-40B4-BE49-F238E27FC236}">
+                <a16:creationId xmlns:a16="http://schemas.microsoft.com/office/drawing/2014/main" id="{11A0BF3F-A699-C20A-8B8A-C21DE6788FE9}"/>
+              </a:ext>
+            </a:extLst>
+          </p:cNvPr>
+          <p:cNvCxnSpPr>
+            <a:cxnSpLocks/>
+            <a:stCxn id="4" idx="5"/>
+            <a:endCxn id="2" idx="3"/>
+          </p:cNvCxnSpPr>
+          <p:nvPr/>
+        </p:nvCxnSpPr>
+        <p:spPr>
+          <a:xfrm rot="16200000" flipH="1">
+            <a:off x="4225262" y="535191"/>
+            <a:ext cx="12700" cy="1871480"/>
+          </a:xfrm>
+          <a:prstGeom prst="curvedConnector3">
+            <a:avLst>
+              <a:gd name="adj1" fmla="val 2984858"/>
+            </a:avLst>
+          </a:prstGeom>
+          <a:ln w="28575">
+            <a:solidFill>
+              <a:schemeClr val="tx1"/>
+            </a:solidFill>
+            <a:tailEnd type="triangle"/>
+          </a:ln>
+        </p:spPr>
+        <p:style>
+          <a:lnRef idx="1">
+            <a:schemeClr val="dk1"/>
+          </a:lnRef>
+          <a:fillRef idx="0">
+            <a:schemeClr val="dk1"/>
+          </a:fillRef>
+          <a:effectRef idx="0">
+            <a:schemeClr val="dk1"/>
+          </a:effectRef>
+          <a:fontRef idx="minor">
+            <a:schemeClr val="tx1"/>
+          </a:fontRef>
+        </p:style>
+      </p:cxnSp>
+      <p:cxnSp>
+        <p:nvCxnSpPr>
+          <p:cNvPr id="22" name="コネクタ: 曲線 21">
+            <a:extLst>
+              <a:ext uri="{FF2B5EF4-FFF2-40B4-BE49-F238E27FC236}">
+                <a16:creationId xmlns:a16="http://schemas.microsoft.com/office/drawing/2014/main" id="{7E114CF6-5A08-FC35-62B8-9187CE8491C0}"/>
+              </a:ext>
+            </a:extLst>
+          </p:cNvPr>
+          <p:cNvCxnSpPr>
+            <a:cxnSpLocks/>
+            <a:stCxn id="2" idx="1"/>
+            <a:endCxn id="4" idx="7"/>
+          </p:cNvCxnSpPr>
+          <p:nvPr/>
+        </p:nvCxnSpPr>
+        <p:spPr>
+          <a:xfrm rot="16200000" flipV="1">
+            <a:off x="4225262" y="-191376"/>
+            <a:ext cx="12700" cy="1871480"/>
+          </a:xfrm>
+          <a:prstGeom prst="curvedConnector3">
+            <a:avLst>
+              <a:gd name="adj1" fmla="val 2984858"/>
+            </a:avLst>
+          </a:prstGeom>
+          <a:ln w="28575">
+            <a:solidFill>
+              <a:schemeClr val="tx1"/>
+            </a:solidFill>
+            <a:tailEnd type="triangle"/>
+          </a:ln>
+        </p:spPr>
+        <p:style>
+          <a:lnRef idx="1">
+            <a:schemeClr val="dk1"/>
+          </a:lnRef>
+          <a:fillRef idx="0">
+            <a:schemeClr val="dk1"/>
+          </a:fillRef>
+          <a:effectRef idx="0">
+            <a:schemeClr val="dk1"/>
+          </a:effectRef>
+          <a:fontRef idx="minor">
+            <a:schemeClr val="tx1"/>
+          </a:fontRef>
+        </p:style>
+      </p:cxnSp>
+      <p:cxnSp>
+        <p:nvCxnSpPr>
+          <p:cNvPr id="25" name="コネクタ: 曲線 24">
+            <a:extLst>
+              <a:ext uri="{FF2B5EF4-FFF2-40B4-BE49-F238E27FC236}">
+                <a16:creationId xmlns:a16="http://schemas.microsoft.com/office/drawing/2014/main" id="{EF22FA37-1BE5-5891-3B31-6CD9560D45D3}"/>
+              </a:ext>
+            </a:extLst>
+          </p:cNvPr>
+          <p:cNvCxnSpPr>
+            <a:cxnSpLocks/>
+            <a:stCxn id="2" idx="5"/>
+            <a:endCxn id="3" idx="3"/>
+          </p:cNvCxnSpPr>
+          <p:nvPr/>
+        </p:nvCxnSpPr>
+        <p:spPr>
+          <a:xfrm rot="5400000" flipH="1" flipV="1">
+            <a:off x="7249225" y="402065"/>
+            <a:ext cx="140485" cy="1997248"/>
+          </a:xfrm>
+          <a:prstGeom prst="curvedConnector3">
+            <a:avLst>
+              <a:gd name="adj1" fmla="val -269835"/>
+            </a:avLst>
+          </a:prstGeom>
+          <a:ln w="28575">
+            <a:solidFill>
+              <a:schemeClr val="tx1"/>
+            </a:solidFill>
+            <a:tailEnd type="triangle"/>
+          </a:ln>
+        </p:spPr>
+        <p:style>
+          <a:lnRef idx="1">
+            <a:schemeClr val="dk1"/>
+          </a:lnRef>
+          <a:fillRef idx="0">
+            <a:schemeClr val="dk1"/>
+          </a:fillRef>
+          <a:effectRef idx="0">
+            <a:schemeClr val="dk1"/>
+          </a:effectRef>
+          <a:fontRef idx="minor">
+            <a:schemeClr val="tx1"/>
+          </a:fontRef>
+        </p:style>
+      </p:cxnSp>
+      <p:cxnSp>
+        <p:nvCxnSpPr>
+          <p:cNvPr id="33" name="コネクタ: 曲線 32">
+            <a:extLst>
+              <a:ext uri="{FF2B5EF4-FFF2-40B4-BE49-F238E27FC236}">
+                <a16:creationId xmlns:a16="http://schemas.microsoft.com/office/drawing/2014/main" id="{0F8D5CC5-AE26-B0CE-C333-99DE63FD22CE}"/>
+              </a:ext>
+            </a:extLst>
+          </p:cNvPr>
+          <p:cNvCxnSpPr>
+            <a:cxnSpLocks/>
+            <a:stCxn id="3" idx="1"/>
+            <a:endCxn id="2" idx="7"/>
+          </p:cNvCxnSpPr>
+          <p:nvPr/>
+        </p:nvCxnSpPr>
+        <p:spPr>
+          <a:xfrm rot="16200000" flipH="1" flipV="1">
+            <a:off x="7249225" y="-324503"/>
+            <a:ext cx="140485" cy="1997248"/>
+          </a:xfrm>
+          <a:prstGeom prst="curvedConnector3">
+            <a:avLst>
+              <a:gd name="adj1" fmla="val -269835"/>
+            </a:avLst>
+          </a:prstGeom>
+          <a:ln w="28575">
+            <a:solidFill>
+              <a:schemeClr val="tx1"/>
+            </a:solidFill>
+            <a:tailEnd type="triangle"/>
+          </a:ln>
+        </p:spPr>
+        <p:style>
+          <a:lnRef idx="1">
+            <a:schemeClr val="dk1"/>
+          </a:lnRef>
+          <a:fillRef idx="0">
+            <a:schemeClr val="dk1"/>
+          </a:fillRef>
+          <a:effectRef idx="0">
+            <a:schemeClr val="dk1"/>
+          </a:effectRef>
+          <a:fontRef idx="minor">
+            <a:schemeClr val="tx1"/>
+          </a:fontRef>
+        </p:style>
+      </p:cxnSp>
+      <p:cxnSp>
+        <p:nvCxnSpPr>
+          <p:cNvPr id="37" name="コネクタ: 曲線 36">
+            <a:extLst>
+              <a:ext uri="{FF2B5EF4-FFF2-40B4-BE49-F238E27FC236}">
+                <a16:creationId xmlns:a16="http://schemas.microsoft.com/office/drawing/2014/main" id="{3BC688B6-FD40-0294-E9A7-E4143E887EBC}"/>
+              </a:ext>
+            </a:extLst>
+          </p:cNvPr>
+          <p:cNvCxnSpPr>
+            <a:cxnSpLocks/>
+            <a:stCxn id="8" idx="5"/>
+            <a:endCxn id="7" idx="3"/>
+          </p:cNvCxnSpPr>
+          <p:nvPr/>
+        </p:nvCxnSpPr>
+        <p:spPr>
+          <a:xfrm rot="16200000" flipH="1">
+            <a:off x="5731963" y="3920178"/>
+            <a:ext cx="12700" cy="1761533"/>
+          </a:xfrm>
+          <a:prstGeom prst="curvedConnector3">
+            <a:avLst>
+              <a:gd name="adj1" fmla="val 2984858"/>
+            </a:avLst>
+          </a:prstGeom>
+          <a:ln w="28575">
+            <a:solidFill>
+              <a:schemeClr val="tx1"/>
+            </a:solidFill>
+            <a:tailEnd type="triangle"/>
+          </a:ln>
+        </p:spPr>
+        <p:style>
+          <a:lnRef idx="1">
+            <a:schemeClr val="dk1"/>
+          </a:lnRef>
+          <a:fillRef idx="0">
+            <a:schemeClr val="dk1"/>
+          </a:fillRef>
+          <a:effectRef idx="0">
+            <a:schemeClr val="dk1"/>
+          </a:effectRef>
+          <a:fontRef idx="minor">
+            <a:schemeClr val="tx1"/>
+          </a:fontRef>
+        </p:style>
+      </p:cxnSp>
+      <p:cxnSp>
+        <p:nvCxnSpPr>
+          <p:cNvPr id="42" name="コネクタ: 曲線 41">
+            <a:extLst>
+              <a:ext uri="{FF2B5EF4-FFF2-40B4-BE49-F238E27FC236}">
+                <a16:creationId xmlns:a16="http://schemas.microsoft.com/office/drawing/2014/main" id="{F76429CE-282C-960B-32E0-ADD809A8A9BE}"/>
+              </a:ext>
+            </a:extLst>
+          </p:cNvPr>
+          <p:cNvCxnSpPr>
+            <a:cxnSpLocks/>
+            <a:stCxn id="7" idx="1"/>
+            <a:endCxn id="8" idx="7"/>
+          </p:cNvCxnSpPr>
+          <p:nvPr/>
+        </p:nvCxnSpPr>
+        <p:spPr>
+          <a:xfrm rot="16200000" flipV="1">
+            <a:off x="5731964" y="3193611"/>
+            <a:ext cx="12700" cy="1761533"/>
+          </a:xfrm>
+          <a:prstGeom prst="curvedConnector3">
+            <a:avLst>
+              <a:gd name="adj1" fmla="val 2984858"/>
+            </a:avLst>
+          </a:prstGeom>
+          <a:ln w="28575">
+            <a:solidFill>
+              <a:schemeClr val="tx1"/>
+            </a:solidFill>
+            <a:tailEnd type="triangle"/>
+          </a:ln>
+        </p:spPr>
+        <p:style>
+          <a:lnRef idx="1">
+            <a:schemeClr val="dk1"/>
+          </a:lnRef>
+          <a:fillRef idx="0">
+            <a:schemeClr val="dk1"/>
+          </a:fillRef>
+          <a:effectRef idx="0">
+            <a:schemeClr val="dk1"/>
+          </a:effectRef>
+          <a:fontRef idx="minor">
+            <a:schemeClr val="tx1"/>
+          </a:fontRef>
+        </p:style>
+      </p:cxnSp>
+      <p:cxnSp>
+        <p:nvCxnSpPr>
+          <p:cNvPr id="46" name="直線矢印コネクタ 45">
+            <a:extLst>
+              <a:ext uri="{FF2B5EF4-FFF2-40B4-BE49-F238E27FC236}">
+                <a16:creationId xmlns:a16="http://schemas.microsoft.com/office/drawing/2014/main" id="{BB928206-F2BD-B8A1-EB8D-7C9DF7F75A75}"/>
+              </a:ext>
+            </a:extLst>
+          </p:cNvPr>
+          <p:cNvCxnSpPr>
+            <a:cxnSpLocks/>
+            <a:stCxn id="2" idx="4"/>
+            <a:endCxn id="5" idx="0"/>
+          </p:cNvCxnSpPr>
+          <p:nvPr/>
+        </p:nvCxnSpPr>
+        <p:spPr>
+          <a:xfrm flipH="1">
+            <a:off x="1831942" y="1621408"/>
+            <a:ext cx="3908981" cy="2284340"/>
+          </a:xfrm>
+          <a:prstGeom prst="straightConnector1">
+            <a:avLst/>
+          </a:prstGeom>
+          <a:ln w="28575">
+            <a:tailEnd type="triangle"/>
+          </a:ln>
+        </p:spPr>
+        <p:style>
+          <a:lnRef idx="1">
+            <a:schemeClr val="dk1"/>
+          </a:lnRef>
+          <a:fillRef idx="0">
+            <a:schemeClr val="dk1"/>
+          </a:fillRef>
+          <a:effectRef idx="0">
+            <a:schemeClr val="dk1"/>
+          </a:effectRef>
+          <a:fontRef idx="minor">
+            <a:schemeClr val="tx1"/>
+          </a:fontRef>
+        </p:style>
+      </p:cxnSp>
+      <p:cxnSp>
+        <p:nvCxnSpPr>
+          <p:cNvPr id="50" name="直線矢印コネクタ 49">
+            <a:extLst>
+              <a:ext uri="{FF2B5EF4-FFF2-40B4-BE49-F238E27FC236}">
+                <a16:creationId xmlns:a16="http://schemas.microsoft.com/office/drawing/2014/main" id="{43A1E541-5E37-4FEA-D7FE-4164054A3E4B}"/>
+              </a:ext>
+            </a:extLst>
+          </p:cNvPr>
+          <p:cNvCxnSpPr>
+            <a:cxnSpLocks/>
+            <a:stCxn id="5" idx="6"/>
+            <a:endCxn id="8" idx="2"/>
+          </p:cNvCxnSpPr>
+          <p:nvPr/>
+        </p:nvCxnSpPr>
+        <p:spPr>
+          <a:xfrm>
+            <a:off x="2652074" y="4419509"/>
+            <a:ext cx="914400" cy="18153"/>
+          </a:xfrm>
+          <a:prstGeom prst="straightConnector1">
+            <a:avLst/>
+          </a:prstGeom>
+          <a:ln w="28575">
+            <a:tailEnd type="triangle"/>
+          </a:ln>
+        </p:spPr>
+        <p:style>
+          <a:lnRef idx="1">
+            <a:schemeClr val="dk1"/>
+          </a:lnRef>
+          <a:fillRef idx="0">
+            <a:schemeClr val="dk1"/>
+          </a:fillRef>
+          <a:effectRef idx="0">
+            <a:schemeClr val="dk1"/>
+          </a:effectRef>
+          <a:fontRef idx="minor">
+            <a:schemeClr val="tx1"/>
+          </a:fontRef>
+        </p:style>
+      </p:cxnSp>
+      <p:cxnSp>
+        <p:nvCxnSpPr>
+          <p:cNvPr id="53" name="直線矢印コネクタ 52">
+            <a:extLst>
+              <a:ext uri="{FF2B5EF4-FFF2-40B4-BE49-F238E27FC236}">
+                <a16:creationId xmlns:a16="http://schemas.microsoft.com/office/drawing/2014/main" id="{9D03604F-AB52-5858-92DC-4D461565D125}"/>
+              </a:ext>
+            </a:extLst>
+          </p:cNvPr>
+          <p:cNvCxnSpPr>
+            <a:cxnSpLocks/>
+            <a:stCxn id="7" idx="6"/>
+            <a:endCxn id="6" idx="2"/>
+          </p:cNvCxnSpPr>
+          <p:nvPr/>
+        </p:nvCxnSpPr>
+        <p:spPr>
+          <a:xfrm>
+            <a:off x="8012783" y="4437662"/>
+            <a:ext cx="885230" cy="0"/>
+          </a:xfrm>
+          <a:prstGeom prst="straightConnector1">
+            <a:avLst/>
+          </a:prstGeom>
+          <a:ln w="28575">
+            <a:tailEnd type="triangle"/>
+          </a:ln>
+        </p:spPr>
+        <p:style>
+          <a:lnRef idx="1">
+            <a:schemeClr val="dk1"/>
+          </a:lnRef>
+          <a:fillRef idx="0">
+            <a:schemeClr val="dk1"/>
+          </a:fillRef>
+          <a:effectRef idx="0">
+            <a:schemeClr val="dk1"/>
+          </a:effectRef>
+          <a:fontRef idx="minor">
+            <a:schemeClr val="tx1"/>
+          </a:fontRef>
+        </p:style>
+      </p:cxnSp>
+      <p:cxnSp>
+        <p:nvCxnSpPr>
+          <p:cNvPr id="56" name="コネクタ: 曲線 55">
+            <a:extLst>
+              <a:ext uri="{FF2B5EF4-FFF2-40B4-BE49-F238E27FC236}">
+                <a16:creationId xmlns:a16="http://schemas.microsoft.com/office/drawing/2014/main" id="{F33D45A3-14C0-805F-1018-BC45CFF56D3B}"/>
+              </a:ext>
+            </a:extLst>
+          </p:cNvPr>
+          <p:cNvCxnSpPr>
+            <a:cxnSpLocks/>
+            <a:stCxn id="6" idx="4"/>
+            <a:endCxn id="5" idx="4"/>
+          </p:cNvCxnSpPr>
+          <p:nvPr/>
+        </p:nvCxnSpPr>
+        <p:spPr>
+          <a:xfrm rot="5400000" flipH="1">
+            <a:off x="5765967" y="999245"/>
+            <a:ext cx="18153" cy="7886203"/>
+          </a:xfrm>
+          <a:prstGeom prst="curvedConnector3">
+            <a:avLst>
+              <a:gd name="adj1" fmla="val -4738589"/>
+            </a:avLst>
+          </a:prstGeom>
+          <a:ln w="28575">
+            <a:solidFill>
+              <a:schemeClr val="tx1"/>
+            </a:solidFill>
+            <a:tailEnd type="triangle"/>
+          </a:ln>
+        </p:spPr>
+        <p:style>
+          <a:lnRef idx="1">
+            <a:schemeClr val="dk1"/>
+          </a:lnRef>
+          <a:fillRef idx="0">
+            <a:schemeClr val="dk1"/>
+          </a:fillRef>
+          <a:effectRef idx="0">
+            <a:schemeClr val="dk1"/>
+          </a:effectRef>
+          <a:fontRef idx="minor">
+            <a:schemeClr val="tx1"/>
+          </a:fontRef>
+        </p:style>
+      </p:cxnSp>
+      <p:cxnSp>
+        <p:nvCxnSpPr>
+          <p:cNvPr id="81" name="直線矢印コネクタ 80">
+            <a:extLst>
+              <a:ext uri="{FF2B5EF4-FFF2-40B4-BE49-F238E27FC236}">
+                <a16:creationId xmlns:a16="http://schemas.microsoft.com/office/drawing/2014/main" id="{8A9655FA-AB0A-75B3-4E3C-08F564738AB1}"/>
+              </a:ext>
+            </a:extLst>
+          </p:cNvPr>
+          <p:cNvCxnSpPr>
+            <a:cxnSpLocks/>
+            <a:stCxn id="6" idx="0"/>
+            <a:endCxn id="2" idx="4"/>
+          </p:cNvCxnSpPr>
+          <p:nvPr/>
+        </p:nvCxnSpPr>
+        <p:spPr>
+          <a:xfrm flipH="1" flipV="1">
+            <a:off x="5740923" y="1621408"/>
+            <a:ext cx="3977222" cy="2302493"/>
+          </a:xfrm>
+          <a:prstGeom prst="straightConnector1">
+            <a:avLst/>
+          </a:prstGeom>
+          <a:ln w="28575">
+            <a:tailEnd type="triangle"/>
+          </a:ln>
+        </p:spPr>
+        <p:style>
+          <a:lnRef idx="1">
+            <a:schemeClr val="dk1"/>
+          </a:lnRef>
+          <a:fillRef idx="0">
+            <a:schemeClr val="dk1"/>
+          </a:fillRef>
+          <a:effectRef idx="0">
+            <a:schemeClr val="dk1"/>
+          </a:effectRef>
+          <a:fontRef idx="minor">
+            <a:schemeClr val="tx1"/>
+          </a:fontRef>
+        </p:style>
+      </p:cxnSp>
+      <p:cxnSp>
+        <p:nvCxnSpPr>
+          <p:cNvPr id="90" name="コネクタ: 曲線 89">
+            <a:extLst>
+              <a:ext uri="{FF2B5EF4-FFF2-40B4-BE49-F238E27FC236}">
+                <a16:creationId xmlns:a16="http://schemas.microsoft.com/office/drawing/2014/main" id="{D79A2586-E404-CDD3-E13C-CD52C0F64CEB}"/>
+              </a:ext>
+            </a:extLst>
+          </p:cNvPr>
+          <p:cNvCxnSpPr>
+            <a:cxnSpLocks/>
+            <a:stCxn id="6" idx="4"/>
+            <a:endCxn id="8" idx="4"/>
+          </p:cNvCxnSpPr>
+          <p:nvPr/>
+        </p:nvCxnSpPr>
+        <p:spPr>
+          <a:xfrm rot="5400000">
+            <a:off x="7018597" y="2251874"/>
+            <a:ext cx="12700" cy="5399097"/>
+          </a:xfrm>
+          <a:prstGeom prst="curvedConnector3">
+            <a:avLst>
+              <a:gd name="adj1" fmla="val 4175260"/>
+            </a:avLst>
+          </a:prstGeom>
+          <a:ln w="28575">
+            <a:solidFill>
+              <a:schemeClr val="tx1"/>
+            </a:solidFill>
+            <a:tailEnd type="triangle"/>
+          </a:ln>
+        </p:spPr>
+        <p:style>
+          <a:lnRef idx="1">
+            <a:schemeClr val="dk1"/>
+          </a:lnRef>
+          <a:fillRef idx="0">
+            <a:schemeClr val="dk1"/>
+          </a:fillRef>
+          <a:effectRef idx="0">
+            <a:schemeClr val="dk1"/>
+          </a:effectRef>
+          <a:fontRef idx="minor">
+            <a:schemeClr val="tx1"/>
+          </a:fontRef>
+        </p:style>
+      </p:cxnSp>
     </p:spTree>
     <p:extLst>
       <p:ext uri="{BB962C8B-B14F-4D97-AF65-F5344CB8AC3E}">
-        <p14:creationId xmlns:p14="http://schemas.microsoft.com/office/powerpoint/2010/main" val="4286174900"/>
+        <p14:creationId xmlns:p14="http://schemas.microsoft.com/office/powerpoint/2010/main" val="516124947"/>
       </p:ext>
     </p:extLst>
   </p:cSld>
@@ -7340,7 +7404,7 @@
           <p:cNvPr id="2" name="テキスト ボックス 1">
             <a:extLst>
               <a:ext uri="{FF2B5EF4-FFF2-40B4-BE49-F238E27FC236}">
-                <a16:creationId xmlns:a16="http://schemas.microsoft.com/office/drawing/2014/main" id="{A2570873-832A-7AA0-07EA-7B2F02CDE8BD}"/>
+                <a16:creationId xmlns:a16="http://schemas.microsoft.com/office/drawing/2014/main" id="{21B82B96-5316-0995-B946-BFDEB437F778}"/>
               </a:ext>
             </a:extLst>
           </p:cNvPr>
@@ -7349,8 +7413,8 @@
         </p:nvSpPr>
         <p:spPr>
           <a:xfrm>
-            <a:off x="1066799" y="659413"/>
-            <a:ext cx="5606716" cy="646331"/>
+            <a:off x="906542" y="1084033"/>
+            <a:ext cx="9725527" cy="5262979"/>
           </a:xfrm>
           <a:prstGeom prst="rect">
             <a:avLst/>
@@ -7363,11 +7427,82 @@
           </a:bodyPr>
           <a:lstStyle/>
           <a:p>
-            <a:r>
-              <a:rPr kumimoji="1" lang="ja-JP" altLang="en-US" sz="3600" b="1" dirty="0"/>
-              <a:t>欲しいクイズ（静的）</a:t>
-            </a:r>
-            <a:endParaRPr kumimoji="1" lang="en-US" altLang="ja-JP" sz="3600" b="1" dirty="0"/>
+            <a:pPr marL="457200" indent="-457200">
+              <a:buFont typeface="Arial" panose="020B0604020202020204" pitchFamily="34" charset="0"/>
+              <a:buChar char="•"/>
+            </a:pPr>
+            <a:r>
+              <a:rPr lang="ja-JP" altLang="en-US" sz="2800" dirty="0"/>
+              <a:t>再配布禁止な音楽素材がプログラム起動時にあるかどうかを判定して、ない場合は音楽をなくす機能</a:t>
+            </a:r>
+            <a:endParaRPr lang="en-US" altLang="ja-JP" sz="2800" dirty="0"/>
+          </a:p>
+          <a:p>
+            <a:pPr marL="457200" indent="-457200">
+              <a:buFont typeface="Arial" panose="020B0604020202020204" pitchFamily="34" charset="0"/>
+              <a:buChar char="•"/>
+            </a:pPr>
+            <a:r>
+              <a:rPr lang="ja-JP" altLang="en-US" sz="2800" dirty="0"/>
+              <a:t>クイズを解くときの音楽の設定（</a:t>
+            </a:r>
+            <a:r>
+              <a:rPr lang="en-US" altLang="ja-JP" sz="2800" dirty="0"/>
+              <a:t>sound</a:t>
+            </a:r>
+            <a:r>
+              <a:rPr lang="ja-JP" altLang="en-US" sz="2800" dirty="0"/>
+              <a:t>フォルダに事前に入れておけば選択できるようにする）</a:t>
+            </a:r>
+            <a:endParaRPr lang="en-US" altLang="ja-JP" sz="2800" dirty="0"/>
+          </a:p>
+          <a:p>
+            <a:pPr marL="457200" indent="-457200">
+              <a:buFont typeface="Arial" panose="020B0604020202020204" pitchFamily="34" charset="0"/>
+              <a:buChar char="•"/>
+            </a:pPr>
+            <a:r>
+              <a:rPr lang="ja-JP" altLang="en-US" sz="2800" dirty="0"/>
+              <a:t>問題文や解説文の大きさに合わせて表の縦幅や横幅を調節できる機能</a:t>
+            </a:r>
+            <a:endParaRPr lang="en-US" altLang="ja-JP" sz="2800" dirty="0"/>
+          </a:p>
+          <a:p>
+            <a:pPr marL="457200" indent="-457200">
+              <a:buFont typeface="Arial" panose="020B0604020202020204" pitchFamily="34" charset="0"/>
+              <a:buChar char="•"/>
+            </a:pPr>
+            <a:r>
+              <a:rPr lang="ja-JP" altLang="en-US" sz="2800" dirty="0"/>
+              <a:t>背景画像の追加</a:t>
+            </a:r>
+            <a:endParaRPr lang="en-US" altLang="ja-JP" sz="2800" dirty="0"/>
+          </a:p>
+          <a:p>
+            <a:pPr marL="457200" indent="-457200">
+              <a:buFont typeface="Arial" panose="020B0604020202020204" pitchFamily="34" charset="0"/>
+              <a:buChar char="•"/>
+            </a:pPr>
+            <a:r>
+              <a:rPr lang="en-US" altLang="ja-JP" sz="2800" dirty="0"/>
+              <a:t>Python </a:t>
+            </a:r>
+            <a:r>
+              <a:rPr lang="ja-JP" altLang="en-US" sz="2800" dirty="0"/>
+              <a:t>の文章の差分を計算するモジュールを用いて、間違い部分だけを赤字で出力する</a:t>
+            </a:r>
+            <a:endParaRPr lang="en-US" altLang="ja-JP" sz="2800" dirty="0"/>
+          </a:p>
+          <a:p>
+            <a:pPr marL="457200" indent="-457200">
+              <a:buFont typeface="Arial" panose="020B0604020202020204" pitchFamily="34" charset="0"/>
+              <a:buChar char="•"/>
+            </a:pPr>
+            <a:r>
+              <a:rPr lang="ja-JP" altLang="en-US" sz="2800" dirty="0"/>
+              <a:t>画面のサイズが動かないように固定する（現状画面ごとにサイズが変わったり、一度マウスでサイズを変えると、そのサイズに固定されたりしている）</a:t>
+            </a:r>
+            <a:endParaRPr lang="en-US" altLang="ja-JP" sz="2800" dirty="0"/>
           </a:p>
         </p:txBody>
       </p:sp>
@@ -7376,7 +7511,7 @@
           <p:cNvPr id="3" name="テキスト ボックス 2">
             <a:extLst>
               <a:ext uri="{FF2B5EF4-FFF2-40B4-BE49-F238E27FC236}">
-                <a16:creationId xmlns:a16="http://schemas.microsoft.com/office/drawing/2014/main" id="{11D084A0-FE85-A088-F6B2-3FC118518D1A}"/>
+                <a16:creationId xmlns:a16="http://schemas.microsoft.com/office/drawing/2014/main" id="{419620DA-EE65-F488-8D27-C3D68A7FC8E9}"/>
               </a:ext>
             </a:extLst>
           </p:cNvPr>
@@ -7385,8 +7520,8 @@
         </p:nvSpPr>
         <p:spPr>
           <a:xfrm>
-            <a:off x="1066798" y="1517666"/>
-            <a:ext cx="9725527" cy="3970318"/>
+            <a:off x="489284" y="159792"/>
+            <a:ext cx="5606716" cy="646331"/>
           </a:xfrm>
           <a:prstGeom prst="rect">
             <a:avLst/>
@@ -7399,123 +7534,18 @@
           </a:bodyPr>
           <a:lstStyle/>
           <a:p>
-            <a:pPr marL="457200" indent="-457200">
-              <a:buFont typeface="Arial" panose="020B0604020202020204" pitchFamily="34" charset="0"/>
-              <a:buChar char="•"/>
-            </a:pPr>
-            <a:r>
-              <a:rPr kumimoji="1" lang="en-US" altLang="ja-JP" sz="2800" dirty="0"/>
-              <a:t>Hallo world </a:t>
-            </a:r>
-            <a:r>
-              <a:rPr kumimoji="1" lang="ja-JP" altLang="en-US" sz="2800" dirty="0"/>
-              <a:t>のサンプルコードを見せて、プログラミング言語を当てるクイズ</a:t>
-            </a:r>
-            <a:endParaRPr kumimoji="1" lang="en-US" altLang="ja-JP" sz="2800" dirty="0"/>
-          </a:p>
-          <a:p>
-            <a:pPr marL="457200" indent="-457200">
-              <a:buFont typeface="Arial" panose="020B0604020202020204" pitchFamily="34" charset="0"/>
-              <a:buChar char="•"/>
-            </a:pPr>
-            <a:r>
-              <a:rPr lang="ja-JP" altLang="en-US" sz="2800" dirty="0"/>
-              <a:t>世界の首都 </a:t>
-            </a:r>
-            <a:r>
-              <a:rPr lang="en-US" altLang="ja-JP" sz="2800" dirty="0" err="1"/>
-              <a:t>CapitalQuizzes</a:t>
-            </a:r>
-            <a:endParaRPr lang="en-US" altLang="ja-JP" sz="2800" dirty="0"/>
-          </a:p>
-          <a:p>
-            <a:pPr marL="457200" indent="-457200">
-              <a:buFont typeface="Arial" panose="020B0604020202020204" pitchFamily="34" charset="0"/>
-              <a:buChar char="•"/>
-            </a:pPr>
-            <a:r>
-              <a:rPr lang="ja-JP" altLang="en-US" sz="2800" dirty="0"/>
-              <a:t>言語当てクイズ </a:t>
-            </a:r>
-            <a:r>
-              <a:rPr lang="en-US" altLang="ja-JP" sz="2800" dirty="0" err="1"/>
-              <a:t>LanguageQuizzes</a:t>
-            </a:r>
-            <a:endParaRPr lang="en-US" altLang="ja-JP" sz="2800" dirty="0"/>
-          </a:p>
-          <a:p>
-            <a:pPr marL="457200" indent="-457200">
-              <a:buFont typeface="Arial" panose="020B0604020202020204" pitchFamily="34" charset="0"/>
-              <a:buChar char="•"/>
-            </a:pPr>
-            <a:r>
-              <a:rPr lang="ja-JP" altLang="en-US" sz="2800" dirty="0"/>
-              <a:t>歴史的事象の年代クイズ </a:t>
-            </a:r>
-            <a:r>
-              <a:rPr lang="en-US" altLang="ja-JP" sz="2800" dirty="0" err="1"/>
-              <a:t>HistoricalEventsQuizzes</a:t>
-            </a:r>
-            <a:endParaRPr lang="en-US" altLang="ja-JP" sz="2800" dirty="0"/>
-          </a:p>
-          <a:p>
-            <a:pPr marL="457200" indent="-457200">
-              <a:buFont typeface="Arial" panose="020B0604020202020204" pitchFamily="34" charset="0"/>
-              <a:buChar char="•"/>
-            </a:pPr>
-            <a:r>
-              <a:rPr lang="ja-JP" altLang="en-US" sz="2800" dirty="0"/>
-              <a:t>元素記号の名前クイズ </a:t>
-            </a:r>
-            <a:r>
-              <a:rPr lang="en-US" altLang="ja-JP" sz="2800" dirty="0" err="1"/>
-              <a:t>ElementSymbolQuiz</a:t>
-            </a:r>
-            <a:endParaRPr lang="en-US" altLang="ja-JP" sz="2800" dirty="0"/>
-          </a:p>
-          <a:p>
-            <a:pPr marL="457200" indent="-457200">
-              <a:buFont typeface="Arial" panose="020B0604020202020204" pitchFamily="34" charset="0"/>
-              <a:buChar char="•"/>
-            </a:pPr>
-            <a:r>
-              <a:rPr lang="ja-JP" altLang="en-US" sz="2800" dirty="0"/>
-              <a:t>与えられた歌詞から曲のタイトルを当て </a:t>
-            </a:r>
-            <a:r>
-              <a:rPr lang="en-US" altLang="ja-JP" sz="2800" dirty="0" err="1"/>
-              <a:t>LyricsQuizzes</a:t>
-            </a:r>
-            <a:endParaRPr lang="en-US" altLang="ja-JP" sz="2800" dirty="0"/>
-          </a:p>
-          <a:p>
-            <a:pPr marL="457200" indent="-457200">
-              <a:buFont typeface="Arial" panose="020B0604020202020204" pitchFamily="34" charset="0"/>
-              <a:buChar char="•"/>
-            </a:pPr>
-            <a:r>
-              <a:rPr lang="ja-JP" altLang="en-US" sz="2800" dirty="0"/>
-              <a:t>有名な哲学的なフレーズのクイズ </a:t>
-            </a:r>
-            <a:r>
-              <a:rPr lang="en-US" altLang="ja-JP" sz="2800" dirty="0" err="1"/>
-              <a:t>FamousQuotesQuiz</a:t>
-            </a:r>
-            <a:endParaRPr lang="en-US" altLang="ja-JP" sz="2800" dirty="0"/>
-          </a:p>
-          <a:p>
-            <a:pPr marL="457200" indent="-457200">
-              <a:buFont typeface="Arial" panose="020B0604020202020204" pitchFamily="34" charset="0"/>
-              <a:buChar char="•"/>
-            </a:pPr>
-            <a:endParaRPr lang="en-US" altLang="ja-JP" sz="2800" dirty="0"/>
+            <a:r>
+              <a:rPr kumimoji="1" lang="ja-JP" altLang="en-US" sz="3600" b="1" dirty="0"/>
+              <a:t>欲しい追加機能</a:t>
+            </a:r>
+            <a:endParaRPr kumimoji="1" lang="en-US" altLang="ja-JP" sz="3600" b="1" dirty="0"/>
           </a:p>
         </p:txBody>
       </p:sp>
     </p:spTree>
     <p:extLst>
       <p:ext uri="{BB962C8B-B14F-4D97-AF65-F5344CB8AC3E}">
-        <p14:creationId xmlns:p14="http://schemas.microsoft.com/office/powerpoint/2010/main" val="193626412"/>
+        <p14:creationId xmlns:p14="http://schemas.microsoft.com/office/powerpoint/2010/main" val="4286174900"/>
       </p:ext>
     </p:extLst>
   </p:cSld>
@@ -7572,6 +7602,213 @@
           <a:p>
             <a:r>
               <a:rPr kumimoji="1" lang="ja-JP" altLang="en-US" sz="3600" b="1" dirty="0"/>
+              <a:t>欲しいクイズ（静的）</a:t>
+            </a:r>
+            <a:endParaRPr kumimoji="1" lang="en-US" altLang="ja-JP" sz="3600" b="1" dirty="0"/>
+          </a:p>
+        </p:txBody>
+      </p:sp>
+      <p:sp>
+        <p:nvSpPr>
+          <p:cNvPr id="3" name="テキスト ボックス 2">
+            <a:extLst>
+              <a:ext uri="{FF2B5EF4-FFF2-40B4-BE49-F238E27FC236}">
+                <a16:creationId xmlns:a16="http://schemas.microsoft.com/office/drawing/2014/main" id="{11D084A0-FE85-A088-F6B2-3FC118518D1A}"/>
+              </a:ext>
+            </a:extLst>
+          </p:cNvPr>
+          <p:cNvSpPr txBox="1"/>
+          <p:nvPr/>
+        </p:nvSpPr>
+        <p:spPr>
+          <a:xfrm>
+            <a:off x="1066798" y="1517666"/>
+            <a:ext cx="9725527" cy="3970318"/>
+          </a:xfrm>
+          <a:prstGeom prst="rect">
+            <a:avLst/>
+          </a:prstGeom>
+          <a:noFill/>
+        </p:spPr>
+        <p:txBody>
+          <a:bodyPr wrap="square" rtlCol="0">
+            <a:spAutoFit/>
+          </a:bodyPr>
+          <a:lstStyle/>
+          <a:p>
+            <a:pPr marL="457200" indent="-457200">
+              <a:buFont typeface="Arial" panose="020B0604020202020204" pitchFamily="34" charset="0"/>
+              <a:buChar char="•"/>
+            </a:pPr>
+            <a:r>
+              <a:rPr kumimoji="1" lang="en-US" altLang="ja-JP" sz="2800" dirty="0"/>
+              <a:t>Hallo world </a:t>
+            </a:r>
+            <a:r>
+              <a:rPr kumimoji="1" lang="ja-JP" altLang="en-US" sz="2800" dirty="0"/>
+              <a:t>のサンプルコードを見せて、プログラミング言語を当てるクイズ</a:t>
+            </a:r>
+            <a:endParaRPr kumimoji="1" lang="en-US" altLang="ja-JP" sz="2800" dirty="0"/>
+          </a:p>
+          <a:p>
+            <a:pPr marL="457200" indent="-457200">
+              <a:buFont typeface="Arial" panose="020B0604020202020204" pitchFamily="34" charset="0"/>
+              <a:buChar char="•"/>
+            </a:pPr>
+            <a:r>
+              <a:rPr lang="ja-JP" altLang="en-US" sz="2800" dirty="0"/>
+              <a:t>世界の首都 </a:t>
+            </a:r>
+            <a:r>
+              <a:rPr lang="en-US" altLang="ja-JP" sz="2800" dirty="0" err="1"/>
+              <a:t>CapitalQuizzes</a:t>
+            </a:r>
+            <a:endParaRPr lang="en-US" altLang="ja-JP" sz="2800" dirty="0"/>
+          </a:p>
+          <a:p>
+            <a:pPr marL="457200" indent="-457200">
+              <a:buFont typeface="Arial" panose="020B0604020202020204" pitchFamily="34" charset="0"/>
+              <a:buChar char="•"/>
+            </a:pPr>
+            <a:r>
+              <a:rPr lang="ja-JP" altLang="en-US" sz="2800" dirty="0"/>
+              <a:t>言語当てクイズ </a:t>
+            </a:r>
+            <a:r>
+              <a:rPr lang="en-US" altLang="ja-JP" sz="2800" dirty="0" err="1"/>
+              <a:t>LanguageQuizzes</a:t>
+            </a:r>
+            <a:endParaRPr lang="en-US" altLang="ja-JP" sz="2800" dirty="0"/>
+          </a:p>
+          <a:p>
+            <a:pPr marL="457200" indent="-457200">
+              <a:buFont typeface="Arial" panose="020B0604020202020204" pitchFamily="34" charset="0"/>
+              <a:buChar char="•"/>
+            </a:pPr>
+            <a:r>
+              <a:rPr lang="ja-JP" altLang="en-US" sz="2800" dirty="0"/>
+              <a:t>歴史的事象の年代クイズ </a:t>
+            </a:r>
+            <a:r>
+              <a:rPr lang="en-US" altLang="ja-JP" sz="2800" dirty="0" err="1"/>
+              <a:t>HistoricalEventsQuizzes</a:t>
+            </a:r>
+            <a:endParaRPr lang="en-US" altLang="ja-JP" sz="2800" dirty="0"/>
+          </a:p>
+          <a:p>
+            <a:pPr marL="457200" indent="-457200">
+              <a:buFont typeface="Arial" panose="020B0604020202020204" pitchFamily="34" charset="0"/>
+              <a:buChar char="•"/>
+            </a:pPr>
+            <a:r>
+              <a:rPr lang="ja-JP" altLang="en-US" sz="2800" dirty="0"/>
+              <a:t>元素記号の名前クイズ </a:t>
+            </a:r>
+            <a:r>
+              <a:rPr lang="en-US" altLang="ja-JP" sz="2800" dirty="0" err="1"/>
+              <a:t>ElementSymbolQuiz</a:t>
+            </a:r>
+            <a:endParaRPr lang="en-US" altLang="ja-JP" sz="2800" dirty="0"/>
+          </a:p>
+          <a:p>
+            <a:pPr marL="457200" indent="-457200">
+              <a:buFont typeface="Arial" panose="020B0604020202020204" pitchFamily="34" charset="0"/>
+              <a:buChar char="•"/>
+            </a:pPr>
+            <a:r>
+              <a:rPr lang="ja-JP" altLang="en-US" sz="2800" dirty="0"/>
+              <a:t>与えられた歌詞から曲のタイトルを当て </a:t>
+            </a:r>
+            <a:r>
+              <a:rPr lang="en-US" altLang="ja-JP" sz="2800" dirty="0" err="1"/>
+              <a:t>LyricsQuizzes</a:t>
+            </a:r>
+            <a:endParaRPr lang="en-US" altLang="ja-JP" sz="2800" dirty="0"/>
+          </a:p>
+          <a:p>
+            <a:pPr marL="457200" indent="-457200">
+              <a:buFont typeface="Arial" panose="020B0604020202020204" pitchFamily="34" charset="0"/>
+              <a:buChar char="•"/>
+            </a:pPr>
+            <a:r>
+              <a:rPr lang="ja-JP" altLang="en-US" sz="2800" dirty="0"/>
+              <a:t>有名な哲学的なフレーズのクイズ </a:t>
+            </a:r>
+            <a:r>
+              <a:rPr lang="en-US" altLang="ja-JP" sz="2800" dirty="0" err="1"/>
+              <a:t>FamousQuotesQuiz</a:t>
+            </a:r>
+            <a:endParaRPr lang="en-US" altLang="ja-JP" sz="2800" dirty="0"/>
+          </a:p>
+          <a:p>
+            <a:pPr marL="457200" indent="-457200">
+              <a:buFont typeface="Arial" panose="020B0604020202020204" pitchFamily="34" charset="0"/>
+              <a:buChar char="•"/>
+            </a:pPr>
+            <a:endParaRPr lang="en-US" altLang="ja-JP" sz="2800" dirty="0"/>
+          </a:p>
+        </p:txBody>
+      </p:sp>
+    </p:spTree>
+    <p:extLst>
+      <p:ext uri="{BB962C8B-B14F-4D97-AF65-F5344CB8AC3E}">
+        <p14:creationId xmlns:p14="http://schemas.microsoft.com/office/powerpoint/2010/main" val="193626412"/>
+      </p:ext>
+    </p:extLst>
+  </p:cSld>
+  <p:clrMapOvr>
+    <a:masterClrMapping/>
+  </p:clrMapOvr>
+</p:sld>
+</file>
+
+<file path=ppt/slides/slide18.xml><?xml version="1.0" encoding="utf-8"?>
+<p:sld xmlns:a="http://schemas.openxmlformats.org/drawingml/2006/main" xmlns:r="http://schemas.openxmlformats.org/officeDocument/2006/relationships" xmlns:p="http://schemas.openxmlformats.org/presentationml/2006/main">
+  <p:cSld>
+    <p:spTree>
+      <p:nvGrpSpPr>
+        <p:cNvPr id="1" name=""/>
+        <p:cNvGrpSpPr/>
+        <p:nvPr/>
+      </p:nvGrpSpPr>
+      <p:grpSpPr>
+        <a:xfrm>
+          <a:off x="0" y="0"/>
+          <a:ext cx="0" cy="0"/>
+          <a:chOff x="0" y="0"/>
+          <a:chExt cx="0" cy="0"/>
+        </a:xfrm>
+      </p:grpSpPr>
+      <p:sp>
+        <p:nvSpPr>
+          <p:cNvPr id="2" name="テキスト ボックス 1">
+            <a:extLst>
+              <a:ext uri="{FF2B5EF4-FFF2-40B4-BE49-F238E27FC236}">
+                <a16:creationId xmlns:a16="http://schemas.microsoft.com/office/drawing/2014/main" id="{A2570873-832A-7AA0-07EA-7B2F02CDE8BD}"/>
+              </a:ext>
+            </a:extLst>
+          </p:cNvPr>
+          <p:cNvSpPr txBox="1"/>
+          <p:nvPr/>
+        </p:nvSpPr>
+        <p:spPr>
+          <a:xfrm>
+            <a:off x="1066799" y="659413"/>
+            <a:ext cx="5606716" cy="646331"/>
+          </a:xfrm>
+          <a:prstGeom prst="rect">
+            <a:avLst/>
+          </a:prstGeom>
+          <a:noFill/>
+        </p:spPr>
+        <p:txBody>
+          <a:bodyPr wrap="square" rtlCol="0">
+            <a:spAutoFit/>
+          </a:bodyPr>
+          <a:lstStyle/>
+          <a:p>
+            <a:r>
+              <a:rPr kumimoji="1" lang="ja-JP" altLang="en-US" sz="3600" b="1" dirty="0"/>
               <a:t>欲しいクイズ（動的）</a:t>
             </a:r>
             <a:endParaRPr kumimoji="1" lang="en-US" altLang="ja-JP" sz="3600" b="1" dirty="0"/>
@@ -7683,7 +7920,7 @@
 </p:sld>
 </file>
 
-<file path=ppt/slides/slide18.xml><?xml version="1.0" encoding="utf-8"?>
+<file path=ppt/slides/slide19.xml><?xml version="1.0" encoding="utf-8"?>
 <p:sld xmlns:a="http://schemas.openxmlformats.org/drawingml/2006/main" xmlns:r="http://schemas.openxmlformats.org/officeDocument/2006/relationships" xmlns:p="http://schemas.openxmlformats.org/presentationml/2006/main">
   <p:cSld>
     <p:spTree>

</xml_diff>

<commit_message>
move a todo list from design.pptx to to_do.txt
</commit_message>
<xml_diff>
--- a/design.pptx
+++ b/design.pptx
@@ -20,10 +20,6 @@
     <p:sldId id="266" r:id="rId14"/>
     <p:sldId id="275" r:id="rId15"/>
     <p:sldId id="274" r:id="rId16"/>
-    <p:sldId id="270" r:id="rId17"/>
-    <p:sldId id="272" r:id="rId18"/>
-    <p:sldId id="271" r:id="rId19"/>
-    <p:sldId id="273" r:id="rId20"/>
   </p:sldIdLst>
   <p:sldSz cx="12192000" cy="6858000"/>
   <p:notesSz cx="6858000" cy="9144000"/>
@@ -277,7 +273,7 @@
           <a:p>
             <a:fld id="{92A24FDA-9713-4B2A-B123-08E9636CCA2B}" type="datetimeFigureOut">
               <a:rPr kumimoji="1" lang="ja-JP" altLang="en-US" smtClean="0"/>
-              <a:t>2023/9/13</a:t>
+              <a:t>2023/10/8</a:t>
             </a:fld>
             <a:endParaRPr kumimoji="1" lang="ja-JP" altLang="en-US"/>
           </a:p>
@@ -507,7 +503,7 @@
           <a:p>
             <a:fld id="{92A24FDA-9713-4B2A-B123-08E9636CCA2B}" type="datetimeFigureOut">
               <a:rPr kumimoji="1" lang="ja-JP" altLang="en-US" smtClean="0"/>
-              <a:t>2023/9/13</a:t>
+              <a:t>2023/10/8</a:t>
             </a:fld>
             <a:endParaRPr kumimoji="1" lang="ja-JP" altLang="en-US"/>
           </a:p>
@@ -747,7 +743,7 @@
           <a:p>
             <a:fld id="{92A24FDA-9713-4B2A-B123-08E9636CCA2B}" type="datetimeFigureOut">
               <a:rPr kumimoji="1" lang="ja-JP" altLang="en-US" smtClean="0"/>
-              <a:t>2023/9/13</a:t>
+              <a:t>2023/10/8</a:t>
             </a:fld>
             <a:endParaRPr kumimoji="1" lang="ja-JP" altLang="en-US"/>
           </a:p>
@@ -977,7 +973,7 @@
           <a:p>
             <a:fld id="{92A24FDA-9713-4B2A-B123-08E9636CCA2B}" type="datetimeFigureOut">
               <a:rPr kumimoji="1" lang="ja-JP" altLang="en-US" smtClean="0"/>
-              <a:t>2023/9/13</a:t>
+              <a:t>2023/10/8</a:t>
             </a:fld>
             <a:endParaRPr kumimoji="1" lang="ja-JP" altLang="en-US"/>
           </a:p>
@@ -1252,7 +1248,7 @@
           <a:p>
             <a:fld id="{92A24FDA-9713-4B2A-B123-08E9636CCA2B}" type="datetimeFigureOut">
               <a:rPr kumimoji="1" lang="ja-JP" altLang="en-US" smtClean="0"/>
-              <a:t>2023/9/13</a:t>
+              <a:t>2023/10/8</a:t>
             </a:fld>
             <a:endParaRPr kumimoji="1" lang="ja-JP" altLang="en-US"/>
           </a:p>
@@ -1581,7 +1577,7 @@
           <a:p>
             <a:fld id="{92A24FDA-9713-4B2A-B123-08E9636CCA2B}" type="datetimeFigureOut">
               <a:rPr kumimoji="1" lang="ja-JP" altLang="en-US" smtClean="0"/>
-              <a:t>2023/9/13</a:t>
+              <a:t>2023/10/8</a:t>
             </a:fld>
             <a:endParaRPr kumimoji="1" lang="ja-JP" altLang="en-US"/>
           </a:p>
@@ -2057,7 +2053,7 @@
           <a:p>
             <a:fld id="{92A24FDA-9713-4B2A-B123-08E9636CCA2B}" type="datetimeFigureOut">
               <a:rPr kumimoji="1" lang="ja-JP" altLang="en-US" smtClean="0"/>
-              <a:t>2023/9/13</a:t>
+              <a:t>2023/10/8</a:t>
             </a:fld>
             <a:endParaRPr kumimoji="1" lang="ja-JP" altLang="en-US"/>
           </a:p>
@@ -2198,7 +2194,7 @@
           <a:p>
             <a:fld id="{92A24FDA-9713-4B2A-B123-08E9636CCA2B}" type="datetimeFigureOut">
               <a:rPr kumimoji="1" lang="ja-JP" altLang="en-US" smtClean="0"/>
-              <a:t>2023/9/13</a:t>
+              <a:t>2023/10/8</a:t>
             </a:fld>
             <a:endParaRPr kumimoji="1" lang="ja-JP" altLang="en-US"/>
           </a:p>
@@ -2311,7 +2307,7 @@
           <a:p>
             <a:fld id="{92A24FDA-9713-4B2A-B123-08E9636CCA2B}" type="datetimeFigureOut">
               <a:rPr kumimoji="1" lang="ja-JP" altLang="en-US" smtClean="0"/>
-              <a:t>2023/9/13</a:t>
+              <a:t>2023/10/8</a:t>
             </a:fld>
             <a:endParaRPr kumimoji="1" lang="ja-JP" altLang="en-US"/>
           </a:p>
@@ -2654,7 +2650,7 @@
           <a:p>
             <a:fld id="{92A24FDA-9713-4B2A-B123-08E9636CCA2B}" type="datetimeFigureOut">
               <a:rPr kumimoji="1" lang="ja-JP" altLang="en-US" smtClean="0"/>
-              <a:t>2023/9/13</a:t>
+              <a:t>2023/10/8</a:t>
             </a:fld>
             <a:endParaRPr kumimoji="1" lang="ja-JP" altLang="en-US"/>
           </a:p>
@@ -2942,7 +2938,7 @@
           <a:p>
             <a:fld id="{92A24FDA-9713-4B2A-B123-08E9636CCA2B}" type="datetimeFigureOut">
               <a:rPr kumimoji="1" lang="ja-JP" altLang="en-US" smtClean="0"/>
-              <a:t>2023/9/13</a:t>
+              <a:t>2023/10/8</a:t>
             </a:fld>
             <a:endParaRPr kumimoji="1" lang="ja-JP" altLang="en-US"/>
           </a:p>
@@ -3215,7 +3211,7 @@
           <a:p>
             <a:fld id="{92A24FDA-9713-4B2A-B123-08E9636CCA2B}" type="datetimeFigureOut">
               <a:rPr kumimoji="1" lang="ja-JP" altLang="en-US" smtClean="0"/>
-              <a:t>2023/9/13</a:t>
+              <a:t>2023/10/8</a:t>
             </a:fld>
             <a:endParaRPr kumimoji="1" lang="ja-JP" altLang="en-US"/>
           </a:p>
@@ -7382,684 +7378,6 @@
 </p:sld>
 </file>
 
-<file path=ppt/slides/slide16.xml><?xml version="1.0" encoding="utf-8"?>
-<p:sld xmlns:a="http://schemas.openxmlformats.org/drawingml/2006/main" xmlns:r="http://schemas.openxmlformats.org/officeDocument/2006/relationships" xmlns:p="http://schemas.openxmlformats.org/presentationml/2006/main">
-  <p:cSld>
-    <p:spTree>
-      <p:nvGrpSpPr>
-        <p:cNvPr id="1" name=""/>
-        <p:cNvGrpSpPr/>
-        <p:nvPr/>
-      </p:nvGrpSpPr>
-      <p:grpSpPr>
-        <a:xfrm>
-          <a:off x="0" y="0"/>
-          <a:ext cx="0" cy="0"/>
-          <a:chOff x="0" y="0"/>
-          <a:chExt cx="0" cy="0"/>
-        </a:xfrm>
-      </p:grpSpPr>
-      <p:sp>
-        <p:nvSpPr>
-          <p:cNvPr id="2" name="テキスト ボックス 1">
-            <a:extLst>
-              <a:ext uri="{FF2B5EF4-FFF2-40B4-BE49-F238E27FC236}">
-                <a16:creationId xmlns:a16="http://schemas.microsoft.com/office/drawing/2014/main" id="{21B82B96-5316-0995-B946-BFDEB437F778}"/>
-              </a:ext>
-            </a:extLst>
-          </p:cNvPr>
-          <p:cNvSpPr txBox="1"/>
-          <p:nvPr/>
-        </p:nvSpPr>
-        <p:spPr>
-          <a:xfrm>
-            <a:off x="906542" y="1084033"/>
-            <a:ext cx="9725527" cy="5262979"/>
-          </a:xfrm>
-          <a:prstGeom prst="rect">
-            <a:avLst/>
-          </a:prstGeom>
-          <a:noFill/>
-        </p:spPr>
-        <p:txBody>
-          <a:bodyPr wrap="square" rtlCol="0">
-            <a:spAutoFit/>
-          </a:bodyPr>
-          <a:lstStyle/>
-          <a:p>
-            <a:pPr marL="457200" indent="-457200">
-              <a:buFont typeface="Arial" panose="020B0604020202020204" pitchFamily="34" charset="0"/>
-              <a:buChar char="•"/>
-            </a:pPr>
-            <a:r>
-              <a:rPr lang="ja-JP" altLang="en-US" sz="2800" dirty="0"/>
-              <a:t>再配布禁止な音楽素材がプログラム起動時にあるかどうかを判定して、ない場合は音楽をなくす機能</a:t>
-            </a:r>
-            <a:endParaRPr lang="en-US" altLang="ja-JP" sz="2800" dirty="0"/>
-          </a:p>
-          <a:p>
-            <a:pPr marL="457200" indent="-457200">
-              <a:buFont typeface="Arial" panose="020B0604020202020204" pitchFamily="34" charset="0"/>
-              <a:buChar char="•"/>
-            </a:pPr>
-            <a:r>
-              <a:rPr lang="ja-JP" altLang="en-US" sz="2800" dirty="0"/>
-              <a:t>クイズを解くときの音楽の設定（</a:t>
-            </a:r>
-            <a:r>
-              <a:rPr lang="en-US" altLang="ja-JP" sz="2800" dirty="0"/>
-              <a:t>sound</a:t>
-            </a:r>
-            <a:r>
-              <a:rPr lang="ja-JP" altLang="en-US" sz="2800" dirty="0"/>
-              <a:t>フォルダに事前に入れておけば選択できるようにする）</a:t>
-            </a:r>
-            <a:endParaRPr lang="en-US" altLang="ja-JP" sz="2800" dirty="0"/>
-          </a:p>
-          <a:p>
-            <a:pPr marL="457200" indent="-457200">
-              <a:buFont typeface="Arial" panose="020B0604020202020204" pitchFamily="34" charset="0"/>
-              <a:buChar char="•"/>
-            </a:pPr>
-            <a:r>
-              <a:rPr lang="ja-JP" altLang="en-US" sz="2800" dirty="0"/>
-              <a:t>問題文や解説文の大きさに合わせて表の縦幅や横幅を調節できる機能</a:t>
-            </a:r>
-            <a:endParaRPr lang="en-US" altLang="ja-JP" sz="2800" dirty="0"/>
-          </a:p>
-          <a:p>
-            <a:pPr marL="457200" indent="-457200">
-              <a:buFont typeface="Arial" panose="020B0604020202020204" pitchFamily="34" charset="0"/>
-              <a:buChar char="•"/>
-            </a:pPr>
-            <a:r>
-              <a:rPr lang="ja-JP" altLang="en-US" sz="2800" dirty="0"/>
-              <a:t>背景画像の追加</a:t>
-            </a:r>
-            <a:endParaRPr lang="en-US" altLang="ja-JP" sz="2800" dirty="0"/>
-          </a:p>
-          <a:p>
-            <a:pPr marL="457200" indent="-457200">
-              <a:buFont typeface="Arial" panose="020B0604020202020204" pitchFamily="34" charset="0"/>
-              <a:buChar char="•"/>
-            </a:pPr>
-            <a:r>
-              <a:rPr lang="en-US" altLang="ja-JP" sz="2800" dirty="0"/>
-              <a:t>Python </a:t>
-            </a:r>
-            <a:r>
-              <a:rPr lang="ja-JP" altLang="en-US" sz="2800" dirty="0"/>
-              <a:t>の文章の差分を計算するモジュールを用いて、間違い部分だけを赤字で出力する</a:t>
-            </a:r>
-            <a:endParaRPr lang="en-US" altLang="ja-JP" sz="2800" dirty="0"/>
-          </a:p>
-          <a:p>
-            <a:pPr marL="457200" indent="-457200">
-              <a:buFont typeface="Arial" panose="020B0604020202020204" pitchFamily="34" charset="0"/>
-              <a:buChar char="•"/>
-            </a:pPr>
-            <a:r>
-              <a:rPr lang="ja-JP" altLang="en-US" sz="2800" dirty="0"/>
-              <a:t>画面のサイズが動かないように固定する（現状画面ごとにサイズが変わったり、一度マウスでサイズを変えると、そのサイズに固定されたりしている）</a:t>
-            </a:r>
-            <a:endParaRPr lang="en-US" altLang="ja-JP" sz="2800" dirty="0"/>
-          </a:p>
-        </p:txBody>
-      </p:sp>
-      <p:sp>
-        <p:nvSpPr>
-          <p:cNvPr id="3" name="テキスト ボックス 2">
-            <a:extLst>
-              <a:ext uri="{FF2B5EF4-FFF2-40B4-BE49-F238E27FC236}">
-                <a16:creationId xmlns:a16="http://schemas.microsoft.com/office/drawing/2014/main" id="{419620DA-EE65-F488-8D27-C3D68A7FC8E9}"/>
-              </a:ext>
-            </a:extLst>
-          </p:cNvPr>
-          <p:cNvSpPr txBox="1"/>
-          <p:nvPr/>
-        </p:nvSpPr>
-        <p:spPr>
-          <a:xfrm>
-            <a:off x="489284" y="159792"/>
-            <a:ext cx="5606716" cy="646331"/>
-          </a:xfrm>
-          <a:prstGeom prst="rect">
-            <a:avLst/>
-          </a:prstGeom>
-          <a:noFill/>
-        </p:spPr>
-        <p:txBody>
-          <a:bodyPr wrap="square" rtlCol="0">
-            <a:spAutoFit/>
-          </a:bodyPr>
-          <a:lstStyle/>
-          <a:p>
-            <a:r>
-              <a:rPr kumimoji="1" lang="ja-JP" altLang="en-US" sz="3600" b="1" dirty="0"/>
-              <a:t>欲しい追加機能</a:t>
-            </a:r>
-            <a:endParaRPr kumimoji="1" lang="en-US" altLang="ja-JP" sz="3600" b="1" dirty="0"/>
-          </a:p>
-        </p:txBody>
-      </p:sp>
-    </p:spTree>
-    <p:extLst>
-      <p:ext uri="{BB962C8B-B14F-4D97-AF65-F5344CB8AC3E}">
-        <p14:creationId xmlns:p14="http://schemas.microsoft.com/office/powerpoint/2010/main" val="4286174900"/>
-      </p:ext>
-    </p:extLst>
-  </p:cSld>
-  <p:clrMapOvr>
-    <a:masterClrMapping/>
-  </p:clrMapOvr>
-</p:sld>
-</file>
-
-<file path=ppt/slides/slide17.xml><?xml version="1.0" encoding="utf-8"?>
-<p:sld xmlns:a="http://schemas.openxmlformats.org/drawingml/2006/main" xmlns:r="http://schemas.openxmlformats.org/officeDocument/2006/relationships" xmlns:p="http://schemas.openxmlformats.org/presentationml/2006/main">
-  <p:cSld>
-    <p:spTree>
-      <p:nvGrpSpPr>
-        <p:cNvPr id="1" name=""/>
-        <p:cNvGrpSpPr/>
-        <p:nvPr/>
-      </p:nvGrpSpPr>
-      <p:grpSpPr>
-        <a:xfrm>
-          <a:off x="0" y="0"/>
-          <a:ext cx="0" cy="0"/>
-          <a:chOff x="0" y="0"/>
-          <a:chExt cx="0" cy="0"/>
-        </a:xfrm>
-      </p:grpSpPr>
-      <p:sp>
-        <p:nvSpPr>
-          <p:cNvPr id="2" name="テキスト ボックス 1">
-            <a:extLst>
-              <a:ext uri="{FF2B5EF4-FFF2-40B4-BE49-F238E27FC236}">
-                <a16:creationId xmlns:a16="http://schemas.microsoft.com/office/drawing/2014/main" id="{A2570873-832A-7AA0-07EA-7B2F02CDE8BD}"/>
-              </a:ext>
-            </a:extLst>
-          </p:cNvPr>
-          <p:cNvSpPr txBox="1"/>
-          <p:nvPr/>
-        </p:nvSpPr>
-        <p:spPr>
-          <a:xfrm>
-            <a:off x="1066799" y="659413"/>
-            <a:ext cx="5606716" cy="646331"/>
-          </a:xfrm>
-          <a:prstGeom prst="rect">
-            <a:avLst/>
-          </a:prstGeom>
-          <a:noFill/>
-        </p:spPr>
-        <p:txBody>
-          <a:bodyPr wrap="square" rtlCol="0">
-            <a:spAutoFit/>
-          </a:bodyPr>
-          <a:lstStyle/>
-          <a:p>
-            <a:r>
-              <a:rPr kumimoji="1" lang="ja-JP" altLang="en-US" sz="3600" b="1" dirty="0"/>
-              <a:t>欲しいクイズ（静的）</a:t>
-            </a:r>
-            <a:endParaRPr kumimoji="1" lang="en-US" altLang="ja-JP" sz="3600" b="1" dirty="0"/>
-          </a:p>
-        </p:txBody>
-      </p:sp>
-      <p:sp>
-        <p:nvSpPr>
-          <p:cNvPr id="3" name="テキスト ボックス 2">
-            <a:extLst>
-              <a:ext uri="{FF2B5EF4-FFF2-40B4-BE49-F238E27FC236}">
-                <a16:creationId xmlns:a16="http://schemas.microsoft.com/office/drawing/2014/main" id="{11D084A0-FE85-A088-F6B2-3FC118518D1A}"/>
-              </a:ext>
-            </a:extLst>
-          </p:cNvPr>
-          <p:cNvSpPr txBox="1"/>
-          <p:nvPr/>
-        </p:nvSpPr>
-        <p:spPr>
-          <a:xfrm>
-            <a:off x="1066798" y="1517666"/>
-            <a:ext cx="9725527" cy="3970318"/>
-          </a:xfrm>
-          <a:prstGeom prst="rect">
-            <a:avLst/>
-          </a:prstGeom>
-          <a:noFill/>
-        </p:spPr>
-        <p:txBody>
-          <a:bodyPr wrap="square" rtlCol="0">
-            <a:spAutoFit/>
-          </a:bodyPr>
-          <a:lstStyle/>
-          <a:p>
-            <a:pPr marL="457200" indent="-457200">
-              <a:buFont typeface="Arial" panose="020B0604020202020204" pitchFamily="34" charset="0"/>
-              <a:buChar char="•"/>
-            </a:pPr>
-            <a:r>
-              <a:rPr kumimoji="1" lang="en-US" altLang="ja-JP" sz="2800" dirty="0"/>
-              <a:t>Hallo world </a:t>
-            </a:r>
-            <a:r>
-              <a:rPr kumimoji="1" lang="ja-JP" altLang="en-US" sz="2800" dirty="0"/>
-              <a:t>のサンプルコードを見せて、プログラミング言語を当てるクイズ</a:t>
-            </a:r>
-            <a:endParaRPr kumimoji="1" lang="en-US" altLang="ja-JP" sz="2800" dirty="0"/>
-          </a:p>
-          <a:p>
-            <a:pPr marL="457200" indent="-457200">
-              <a:buFont typeface="Arial" panose="020B0604020202020204" pitchFamily="34" charset="0"/>
-              <a:buChar char="•"/>
-            </a:pPr>
-            <a:r>
-              <a:rPr lang="ja-JP" altLang="en-US" sz="2800" dirty="0"/>
-              <a:t>世界の首都 </a:t>
-            </a:r>
-            <a:r>
-              <a:rPr lang="en-US" altLang="ja-JP" sz="2800" dirty="0" err="1"/>
-              <a:t>CapitalQuizzes</a:t>
-            </a:r>
-            <a:endParaRPr lang="en-US" altLang="ja-JP" sz="2800" dirty="0"/>
-          </a:p>
-          <a:p>
-            <a:pPr marL="457200" indent="-457200">
-              <a:buFont typeface="Arial" panose="020B0604020202020204" pitchFamily="34" charset="0"/>
-              <a:buChar char="•"/>
-            </a:pPr>
-            <a:r>
-              <a:rPr lang="ja-JP" altLang="en-US" sz="2800" dirty="0"/>
-              <a:t>言語当てクイズ </a:t>
-            </a:r>
-            <a:r>
-              <a:rPr lang="en-US" altLang="ja-JP" sz="2800" dirty="0" err="1"/>
-              <a:t>LanguageQuizzes</a:t>
-            </a:r>
-            <a:endParaRPr lang="en-US" altLang="ja-JP" sz="2800" dirty="0"/>
-          </a:p>
-          <a:p>
-            <a:pPr marL="457200" indent="-457200">
-              <a:buFont typeface="Arial" panose="020B0604020202020204" pitchFamily="34" charset="0"/>
-              <a:buChar char="•"/>
-            </a:pPr>
-            <a:r>
-              <a:rPr lang="ja-JP" altLang="en-US" sz="2800" dirty="0"/>
-              <a:t>歴史的事象の年代クイズ </a:t>
-            </a:r>
-            <a:r>
-              <a:rPr lang="en-US" altLang="ja-JP" sz="2800" dirty="0" err="1"/>
-              <a:t>HistoricalEventsQuizzes</a:t>
-            </a:r>
-            <a:endParaRPr lang="en-US" altLang="ja-JP" sz="2800" dirty="0"/>
-          </a:p>
-          <a:p>
-            <a:pPr marL="457200" indent="-457200">
-              <a:buFont typeface="Arial" panose="020B0604020202020204" pitchFamily="34" charset="0"/>
-              <a:buChar char="•"/>
-            </a:pPr>
-            <a:r>
-              <a:rPr lang="ja-JP" altLang="en-US" sz="2800" dirty="0"/>
-              <a:t>元素記号の名前クイズ </a:t>
-            </a:r>
-            <a:r>
-              <a:rPr lang="en-US" altLang="ja-JP" sz="2800" dirty="0" err="1"/>
-              <a:t>ElementSymbolQuiz</a:t>
-            </a:r>
-            <a:endParaRPr lang="en-US" altLang="ja-JP" sz="2800" dirty="0"/>
-          </a:p>
-          <a:p>
-            <a:pPr marL="457200" indent="-457200">
-              <a:buFont typeface="Arial" panose="020B0604020202020204" pitchFamily="34" charset="0"/>
-              <a:buChar char="•"/>
-            </a:pPr>
-            <a:r>
-              <a:rPr lang="ja-JP" altLang="en-US" sz="2800" dirty="0"/>
-              <a:t>与えられた歌詞から曲のタイトルを当て </a:t>
-            </a:r>
-            <a:r>
-              <a:rPr lang="en-US" altLang="ja-JP" sz="2800" dirty="0" err="1"/>
-              <a:t>LyricsQuizzes</a:t>
-            </a:r>
-            <a:endParaRPr lang="en-US" altLang="ja-JP" sz="2800" dirty="0"/>
-          </a:p>
-          <a:p>
-            <a:pPr marL="457200" indent="-457200">
-              <a:buFont typeface="Arial" panose="020B0604020202020204" pitchFamily="34" charset="0"/>
-              <a:buChar char="•"/>
-            </a:pPr>
-            <a:r>
-              <a:rPr lang="ja-JP" altLang="en-US" sz="2800" dirty="0"/>
-              <a:t>有名な哲学的なフレーズのクイズ </a:t>
-            </a:r>
-            <a:r>
-              <a:rPr lang="en-US" altLang="ja-JP" sz="2800" dirty="0" err="1"/>
-              <a:t>FamousQuotesQuiz</a:t>
-            </a:r>
-            <a:endParaRPr lang="en-US" altLang="ja-JP" sz="2800" dirty="0"/>
-          </a:p>
-          <a:p>
-            <a:pPr marL="457200" indent="-457200">
-              <a:buFont typeface="Arial" panose="020B0604020202020204" pitchFamily="34" charset="0"/>
-              <a:buChar char="•"/>
-            </a:pPr>
-            <a:endParaRPr lang="en-US" altLang="ja-JP" sz="2800" dirty="0"/>
-          </a:p>
-        </p:txBody>
-      </p:sp>
-    </p:spTree>
-    <p:extLst>
-      <p:ext uri="{BB962C8B-B14F-4D97-AF65-F5344CB8AC3E}">
-        <p14:creationId xmlns:p14="http://schemas.microsoft.com/office/powerpoint/2010/main" val="193626412"/>
-      </p:ext>
-    </p:extLst>
-  </p:cSld>
-  <p:clrMapOvr>
-    <a:masterClrMapping/>
-  </p:clrMapOvr>
-</p:sld>
-</file>
-
-<file path=ppt/slides/slide18.xml><?xml version="1.0" encoding="utf-8"?>
-<p:sld xmlns:a="http://schemas.openxmlformats.org/drawingml/2006/main" xmlns:r="http://schemas.openxmlformats.org/officeDocument/2006/relationships" xmlns:p="http://schemas.openxmlformats.org/presentationml/2006/main">
-  <p:cSld>
-    <p:spTree>
-      <p:nvGrpSpPr>
-        <p:cNvPr id="1" name=""/>
-        <p:cNvGrpSpPr/>
-        <p:nvPr/>
-      </p:nvGrpSpPr>
-      <p:grpSpPr>
-        <a:xfrm>
-          <a:off x="0" y="0"/>
-          <a:ext cx="0" cy="0"/>
-          <a:chOff x="0" y="0"/>
-          <a:chExt cx="0" cy="0"/>
-        </a:xfrm>
-      </p:grpSpPr>
-      <p:sp>
-        <p:nvSpPr>
-          <p:cNvPr id="2" name="テキスト ボックス 1">
-            <a:extLst>
-              <a:ext uri="{FF2B5EF4-FFF2-40B4-BE49-F238E27FC236}">
-                <a16:creationId xmlns:a16="http://schemas.microsoft.com/office/drawing/2014/main" id="{A2570873-832A-7AA0-07EA-7B2F02CDE8BD}"/>
-              </a:ext>
-            </a:extLst>
-          </p:cNvPr>
-          <p:cNvSpPr txBox="1"/>
-          <p:nvPr/>
-        </p:nvSpPr>
-        <p:spPr>
-          <a:xfrm>
-            <a:off x="1066799" y="659413"/>
-            <a:ext cx="5606716" cy="646331"/>
-          </a:xfrm>
-          <a:prstGeom prst="rect">
-            <a:avLst/>
-          </a:prstGeom>
-          <a:noFill/>
-        </p:spPr>
-        <p:txBody>
-          <a:bodyPr wrap="square" rtlCol="0">
-            <a:spAutoFit/>
-          </a:bodyPr>
-          <a:lstStyle/>
-          <a:p>
-            <a:r>
-              <a:rPr kumimoji="1" lang="ja-JP" altLang="en-US" sz="3600" b="1" dirty="0"/>
-              <a:t>欲しいクイズ（動的）</a:t>
-            </a:r>
-            <a:endParaRPr kumimoji="1" lang="en-US" altLang="ja-JP" sz="3600" b="1" dirty="0"/>
-          </a:p>
-        </p:txBody>
-      </p:sp>
-      <p:sp>
-        <p:nvSpPr>
-          <p:cNvPr id="3" name="テキスト ボックス 2">
-            <a:extLst>
-              <a:ext uri="{FF2B5EF4-FFF2-40B4-BE49-F238E27FC236}">
-                <a16:creationId xmlns:a16="http://schemas.microsoft.com/office/drawing/2014/main" id="{11D084A0-FE85-A088-F6B2-3FC118518D1A}"/>
-              </a:ext>
-            </a:extLst>
-          </p:cNvPr>
-          <p:cNvSpPr txBox="1"/>
-          <p:nvPr/>
-        </p:nvSpPr>
-        <p:spPr>
-          <a:xfrm>
-            <a:off x="1066798" y="1517666"/>
-            <a:ext cx="9725527" cy="2246769"/>
-          </a:xfrm>
-          <a:prstGeom prst="rect">
-            <a:avLst/>
-          </a:prstGeom>
-          <a:noFill/>
-        </p:spPr>
-        <p:txBody>
-          <a:bodyPr wrap="square" rtlCol="0">
-            <a:spAutoFit/>
-          </a:bodyPr>
-          <a:lstStyle/>
-          <a:p>
-            <a:pPr marL="457200" indent="-457200">
-              <a:buFont typeface="Arial" panose="020B0604020202020204" pitchFamily="34" charset="0"/>
-              <a:buChar char="•"/>
-            </a:pPr>
-            <a:r>
-              <a:rPr lang="en-US" altLang="ja-JP" sz="2800" dirty="0"/>
-              <a:t>Python </a:t>
-            </a:r>
-            <a:r>
-              <a:rPr lang="ja-JP" altLang="en-US" sz="2800" dirty="0"/>
-              <a:t>のキーワードやモジュール名の英単語タイピング</a:t>
-            </a:r>
-            <a:endParaRPr lang="en-US" altLang="ja-JP" sz="2800" dirty="0"/>
-          </a:p>
-          <a:p>
-            <a:pPr marL="457200" indent="-457200">
-              <a:buFont typeface="Arial" panose="020B0604020202020204" pitchFamily="34" charset="0"/>
-              <a:buChar char="•"/>
-            </a:pPr>
-            <a:r>
-              <a:rPr lang="ja-JP" altLang="en-US" sz="2800" dirty="0"/>
-              <a:t>シーザー暗号</a:t>
-            </a:r>
-            <a:endParaRPr lang="en-US" altLang="ja-JP" sz="2800" dirty="0"/>
-          </a:p>
-          <a:p>
-            <a:pPr marL="457200" indent="-457200">
-              <a:buFont typeface="Arial" panose="020B0604020202020204" pitchFamily="34" charset="0"/>
-              <a:buChar char="•"/>
-            </a:pPr>
-            <a:r>
-              <a:rPr lang="ja-JP" altLang="en-US" sz="2800" dirty="0"/>
-              <a:t>素因数分解クイズ </a:t>
-            </a:r>
-            <a:r>
-              <a:rPr lang="en-US" altLang="ja-JP" sz="2800" dirty="0" err="1"/>
-              <a:t>PrimeFactorizationQuizzes</a:t>
-            </a:r>
-            <a:endParaRPr lang="en-US" altLang="ja-JP" sz="2800" dirty="0"/>
-          </a:p>
-          <a:p>
-            <a:pPr marL="457200" indent="-457200">
-              <a:buFont typeface="Arial" panose="020B0604020202020204" pitchFamily="34" charset="0"/>
-              <a:buChar char="•"/>
-            </a:pPr>
-            <a:r>
-              <a:rPr lang="ja-JP" altLang="en-US" sz="2800" dirty="0"/>
-              <a:t>素数判定クイズ  </a:t>
-            </a:r>
-            <a:r>
-              <a:rPr lang="en-US" altLang="ja-JP" sz="2800" dirty="0" err="1"/>
-              <a:t>PrimeQuizzes</a:t>
-            </a:r>
-            <a:endParaRPr lang="en-US" altLang="ja-JP" sz="2800" dirty="0"/>
-          </a:p>
-          <a:p>
-            <a:pPr marL="457200" indent="-457200">
-              <a:buFont typeface="Arial" panose="020B0604020202020204" pitchFamily="34" charset="0"/>
-              <a:buChar char="•"/>
-            </a:pPr>
-            <a:endParaRPr lang="en-US" altLang="ja-JP" sz="2800" dirty="0"/>
-          </a:p>
-        </p:txBody>
-      </p:sp>
-    </p:spTree>
-    <p:extLst>
-      <p:ext uri="{BB962C8B-B14F-4D97-AF65-F5344CB8AC3E}">
-        <p14:creationId xmlns:p14="http://schemas.microsoft.com/office/powerpoint/2010/main" val="99756"/>
-      </p:ext>
-    </p:extLst>
-  </p:cSld>
-  <p:clrMapOvr>
-    <a:masterClrMapping/>
-  </p:clrMapOvr>
-</p:sld>
-</file>
-
-<file path=ppt/slides/slide19.xml><?xml version="1.0" encoding="utf-8"?>
-<p:sld xmlns:a="http://schemas.openxmlformats.org/drawingml/2006/main" xmlns:r="http://schemas.openxmlformats.org/officeDocument/2006/relationships" xmlns:p="http://schemas.openxmlformats.org/presentationml/2006/main">
-  <p:cSld>
-    <p:spTree>
-      <p:nvGrpSpPr>
-        <p:cNvPr id="1" name=""/>
-        <p:cNvGrpSpPr/>
-        <p:nvPr/>
-      </p:nvGrpSpPr>
-      <p:grpSpPr>
-        <a:xfrm>
-          <a:off x="0" y="0"/>
-          <a:ext cx="0" cy="0"/>
-          <a:chOff x="0" y="0"/>
-          <a:chExt cx="0" cy="0"/>
-        </a:xfrm>
-      </p:grpSpPr>
-      <p:sp>
-        <p:nvSpPr>
-          <p:cNvPr id="2" name="テキスト ボックス 1">
-            <a:extLst>
-              <a:ext uri="{FF2B5EF4-FFF2-40B4-BE49-F238E27FC236}">
-                <a16:creationId xmlns:a16="http://schemas.microsoft.com/office/drawing/2014/main" id="{F46D5EE6-9779-8D1B-E58D-1D251899DA97}"/>
-              </a:ext>
-            </a:extLst>
-          </p:cNvPr>
-          <p:cNvSpPr txBox="1"/>
-          <p:nvPr/>
-        </p:nvSpPr>
-        <p:spPr>
-          <a:xfrm>
-            <a:off x="585536" y="442845"/>
-            <a:ext cx="5606716" cy="646331"/>
-          </a:xfrm>
-          <a:prstGeom prst="rect">
-            <a:avLst/>
-          </a:prstGeom>
-          <a:noFill/>
-        </p:spPr>
-        <p:txBody>
-          <a:bodyPr wrap="square" rtlCol="0">
-            <a:spAutoFit/>
-          </a:bodyPr>
-          <a:lstStyle/>
-          <a:p>
-            <a:r>
-              <a:rPr lang="ja-JP" altLang="en-US" sz="3600" b="1" dirty="0"/>
-              <a:t>メモ</a:t>
-            </a:r>
-            <a:endParaRPr kumimoji="1" lang="en-US" altLang="ja-JP" sz="3600" b="1" dirty="0"/>
-          </a:p>
-        </p:txBody>
-      </p:sp>
-      <p:sp>
-        <p:nvSpPr>
-          <p:cNvPr id="3" name="テキスト ボックス 2">
-            <a:extLst>
-              <a:ext uri="{FF2B5EF4-FFF2-40B4-BE49-F238E27FC236}">
-                <a16:creationId xmlns:a16="http://schemas.microsoft.com/office/drawing/2014/main" id="{46EA2493-3C67-1A7D-2AA3-1D5270D3FC29}"/>
-              </a:ext>
-            </a:extLst>
-          </p:cNvPr>
-          <p:cNvSpPr txBox="1"/>
-          <p:nvPr/>
-        </p:nvSpPr>
-        <p:spPr>
-          <a:xfrm>
-            <a:off x="1233236" y="1089176"/>
-            <a:ext cx="9725527" cy="5693866"/>
-          </a:xfrm>
-          <a:prstGeom prst="rect">
-            <a:avLst/>
-          </a:prstGeom>
-          <a:noFill/>
-        </p:spPr>
-        <p:txBody>
-          <a:bodyPr wrap="square" rtlCol="0">
-            <a:spAutoFit/>
-          </a:bodyPr>
-          <a:lstStyle/>
-          <a:p>
-            <a:pPr marL="457200" indent="-457200">
-              <a:buFont typeface="Arial" panose="020B0604020202020204" pitchFamily="34" charset="0"/>
-              <a:buChar char="•"/>
-            </a:pPr>
-            <a:r>
-              <a:rPr lang="ja-JP" altLang="en-US" sz="2800" dirty="0"/>
-              <a:t>（テーブル、スクロールバー、詳細ボタン、詳細ボタンを押したら、表の下に詳細として表示されるラベル）をまとめたフレームを用意する。こうすると、タイトルからのログ画面、クイズのログ画面、クイズデータの選択画面に使える</a:t>
-            </a:r>
-            <a:endParaRPr lang="en-US" altLang="ja-JP" sz="2800" dirty="0"/>
-          </a:p>
-          <a:p>
-            <a:pPr marL="457200" indent="-457200">
-              <a:buFont typeface="Arial" panose="020B0604020202020204" pitchFamily="34" charset="0"/>
-              <a:buChar char="•"/>
-            </a:pPr>
-            <a:endParaRPr lang="en-US" altLang="ja-JP" sz="2800" dirty="0"/>
-          </a:p>
-          <a:p>
-            <a:pPr marL="457200" indent="-457200">
-              <a:buFont typeface="Arial" panose="020B0604020202020204" pitchFamily="34" charset="0"/>
-              <a:buChar char="•"/>
-            </a:pPr>
-            <a:r>
-              <a:rPr lang="ja-JP" altLang="en-US" sz="2800" dirty="0"/>
-              <a:t>現状クイズデータは起動時にデータベースを全て読み込んで作成している．起動中にデータを追加しても反映されない。クイズのデータフォルダから各クイズの </a:t>
-            </a:r>
-            <a:r>
-              <a:rPr lang="en-US" altLang="ja-JP" sz="2800" dirty="0"/>
-              <a:t>overview </a:t>
-            </a:r>
-            <a:r>
-              <a:rPr lang="ja-JP" altLang="en-US" sz="2800" dirty="0"/>
-              <a:t>だけを取得してクイズデータの選択画面に表示し、クイズデータは問題に選ばれたと時に動的に取得する方が良いか？毎回読み込み直す </a:t>
-            </a:r>
-            <a:r>
-              <a:rPr lang="en-US" altLang="ja-JP" sz="2800" dirty="0"/>
-              <a:t>or </a:t>
-            </a:r>
-            <a:r>
-              <a:rPr lang="ja-JP" altLang="en-US" sz="2800" dirty="0"/>
-              <a:t>最初にそのクイズを使うときに読み込みゲーム終了時まで保持しておく</a:t>
-            </a:r>
-            <a:endParaRPr lang="en-US" altLang="ja-JP" sz="2800" dirty="0"/>
-          </a:p>
-        </p:txBody>
-      </p:sp>
-    </p:spTree>
-    <p:extLst>
-      <p:ext uri="{BB962C8B-B14F-4D97-AF65-F5344CB8AC3E}">
-        <p14:creationId xmlns:p14="http://schemas.microsoft.com/office/powerpoint/2010/main" val="1366685118"/>
-      </p:ext>
-    </p:extLst>
-  </p:cSld>
-  <p:clrMapOvr>
-    <a:masterClrMapping/>
-  </p:clrMapOvr>
-</p:sld>
-</file>
-
 <file path=ppt/slides/slide2.xml><?xml version="1.0" encoding="utf-8"?>
 <p:sld xmlns:a="http://schemas.openxmlformats.org/drawingml/2006/main" xmlns:r="http://schemas.openxmlformats.org/officeDocument/2006/relationships" xmlns:p="http://schemas.openxmlformats.org/presentationml/2006/main">
   <p:cSld>

</xml_diff>